<commit_message>
NLMS | Capstone | Output
PDF and PPT checked in.
</commit_message>
<xml_diff>
--- a/output/Suicidal Catalysts.pptx
+++ b/output/Suicidal Catalysts.pptx
@@ -5,20 +5,33 @@
     <p:sldMasterId id="2147483648" r:id="rId1"/>
   </p:sldMasterIdLst>
   <p:notesMasterIdLst>
-    <p:notesMasterId r:id="rId13"/>
+    <p:notesMasterId r:id="rId26"/>
   </p:notesMasterIdLst>
   <p:sldIdLst>
     <p:sldId id="256" r:id="rId2"/>
-    <p:sldId id="257" r:id="rId3"/>
-    <p:sldId id="258" r:id="rId4"/>
-    <p:sldId id="259" r:id="rId5"/>
-    <p:sldId id="260" r:id="rId6"/>
-    <p:sldId id="261" r:id="rId7"/>
-    <p:sldId id="262" r:id="rId8"/>
-    <p:sldId id="263" r:id="rId9"/>
-    <p:sldId id="264" r:id="rId10"/>
-    <p:sldId id="265" r:id="rId11"/>
-    <p:sldId id="266" r:id="rId12"/>
+    <p:sldId id="280" r:id="rId3"/>
+    <p:sldId id="257" r:id="rId4"/>
+    <p:sldId id="258" r:id="rId5"/>
+    <p:sldId id="259" r:id="rId6"/>
+    <p:sldId id="260" r:id="rId7"/>
+    <p:sldId id="261" r:id="rId8"/>
+    <p:sldId id="262" r:id="rId9"/>
+    <p:sldId id="263" r:id="rId10"/>
+    <p:sldId id="264" r:id="rId11"/>
+    <p:sldId id="265" r:id="rId12"/>
+    <p:sldId id="266" r:id="rId13"/>
+    <p:sldId id="267" r:id="rId14"/>
+    <p:sldId id="268" r:id="rId15"/>
+    <p:sldId id="269" r:id="rId16"/>
+    <p:sldId id="270" r:id="rId17"/>
+    <p:sldId id="272" r:id="rId18"/>
+    <p:sldId id="271" r:id="rId19"/>
+    <p:sldId id="274" r:id="rId20"/>
+    <p:sldId id="275" r:id="rId21"/>
+    <p:sldId id="276" r:id="rId22"/>
+    <p:sldId id="277" r:id="rId23"/>
+    <p:sldId id="278" r:id="rId24"/>
+    <p:sldId id="279" r:id="rId25"/>
   </p:sldIdLst>
   <p:sldSz cx="9144000" cy="6858000" type="screen4x3"/>
   <p:notesSz cx="6858000" cy="9144000"/>
@@ -549,7 +562,7 @@
           <a:p>
             <a:fld id="{321C9D84-9BB0-4ECD-B693-60559829FA29}" type="slidenum">
               <a:rPr lang="en-US" smtClean="0"/>
-              <a:t>2</a:t>
+              <a:t>3</a:t>
             </a:fld>
             <a:endParaRPr lang="en-US"/>
           </a:p>
@@ -559,6 +572,978 @@
     <p:extLst>
       <p:ext uri="{BB962C8B-B14F-4D97-AF65-F5344CB8AC3E}">
         <p14:creationId xmlns:p14="http://schemas.microsoft.com/office/powerpoint/2010/main" val="2614952453"/>
+      </p:ext>
+    </p:extLst>
+  </p:cSld>
+  <p:clrMapOvr>
+    <a:masterClrMapping/>
+  </p:clrMapOvr>
+</p:notes>
+</file>
+
+<file path=ppt/notesSlides/notesSlide10.xml><?xml version="1.0" encoding="utf-8"?>
+<p:notes xmlns:a="http://schemas.openxmlformats.org/drawingml/2006/main" xmlns:r="http://schemas.openxmlformats.org/officeDocument/2006/relationships" xmlns:p="http://schemas.openxmlformats.org/presentationml/2006/main">
+  <p:cSld>
+    <p:spTree>
+      <p:nvGrpSpPr>
+        <p:cNvPr id="1" name=""/>
+        <p:cNvGrpSpPr/>
+        <p:nvPr/>
+      </p:nvGrpSpPr>
+      <p:grpSpPr>
+        <a:xfrm>
+          <a:off x="0" y="0"/>
+          <a:ext cx="0" cy="0"/>
+          <a:chOff x="0" y="0"/>
+          <a:chExt cx="0" cy="0"/>
+        </a:xfrm>
+      </p:grpSpPr>
+      <p:sp>
+        <p:nvSpPr>
+          <p:cNvPr id="2" name="Slide Image Placeholder 1"/>
+          <p:cNvSpPr>
+            <a:spLocks noGrp="1" noRot="1" noChangeAspect="1"/>
+          </p:cNvSpPr>
+          <p:nvPr>
+            <p:ph type="sldImg"/>
+          </p:nvPr>
+        </p:nvSpPr>
+        <p:spPr/>
+      </p:sp>
+      <p:sp>
+        <p:nvSpPr>
+          <p:cNvPr id="3" name="Notes Placeholder 2"/>
+          <p:cNvSpPr>
+            <a:spLocks noGrp="1"/>
+          </p:cNvSpPr>
+          <p:nvPr>
+            <p:ph type="body" idx="1"/>
+          </p:nvPr>
+        </p:nvSpPr>
+        <p:spPr/>
+        <p:txBody>
+          <a:bodyPr/>
+          <a:lstStyle/>
+          <a:p>
+            <a:r>
+              <a:rPr lang="en-US" dirty="0" smtClean="0"/>
+              <a:t>Survival</a:t>
+            </a:r>
+            <a:r>
+              <a:rPr lang="en-US" baseline="0" dirty="0" smtClean="0"/>
+              <a:t> Analysis provides a set of methods to analyze the Loss of Lives to know the proportion of Population that’ll survive at a certain point of time, How does any Factor increase or decrease the probability of Survival?</a:t>
+            </a:r>
+            <a:endParaRPr lang="en-US" dirty="0"/>
+          </a:p>
+        </p:txBody>
+      </p:sp>
+      <p:sp>
+        <p:nvSpPr>
+          <p:cNvPr id="4" name="Slide Number Placeholder 3"/>
+          <p:cNvSpPr>
+            <a:spLocks noGrp="1"/>
+          </p:cNvSpPr>
+          <p:nvPr>
+            <p:ph type="sldNum" sz="quarter" idx="10"/>
+          </p:nvPr>
+        </p:nvSpPr>
+        <p:spPr/>
+        <p:txBody>
+          <a:bodyPr/>
+          <a:lstStyle/>
+          <a:p>
+            <a:fld id="{321C9D84-9BB0-4ECD-B693-60559829FA29}" type="slidenum">
+              <a:rPr lang="en-US" smtClean="0"/>
+              <a:t>13</a:t>
+            </a:fld>
+            <a:endParaRPr lang="en-US"/>
+          </a:p>
+        </p:txBody>
+      </p:sp>
+    </p:spTree>
+    <p:extLst>
+      <p:ext uri="{BB962C8B-B14F-4D97-AF65-F5344CB8AC3E}">
+        <p14:creationId xmlns:p14="http://schemas.microsoft.com/office/powerpoint/2010/main" val="672315824"/>
+      </p:ext>
+    </p:extLst>
+  </p:cSld>
+  <p:clrMapOvr>
+    <a:masterClrMapping/>
+  </p:clrMapOvr>
+</p:notes>
+</file>
+
+<file path=ppt/notesSlides/notesSlide11.xml><?xml version="1.0" encoding="utf-8"?>
+<p:notes xmlns:a="http://schemas.openxmlformats.org/drawingml/2006/main" xmlns:r="http://schemas.openxmlformats.org/officeDocument/2006/relationships" xmlns:p="http://schemas.openxmlformats.org/presentationml/2006/main">
+  <p:cSld>
+    <p:spTree>
+      <p:nvGrpSpPr>
+        <p:cNvPr id="1" name=""/>
+        <p:cNvGrpSpPr/>
+        <p:nvPr/>
+      </p:nvGrpSpPr>
+      <p:grpSpPr>
+        <a:xfrm>
+          <a:off x="0" y="0"/>
+          <a:ext cx="0" cy="0"/>
+          <a:chOff x="0" y="0"/>
+          <a:chExt cx="0" cy="0"/>
+        </a:xfrm>
+      </p:grpSpPr>
+      <p:sp>
+        <p:nvSpPr>
+          <p:cNvPr id="2" name="Slide Image Placeholder 1"/>
+          <p:cNvSpPr>
+            <a:spLocks noGrp="1" noRot="1" noChangeAspect="1"/>
+          </p:cNvSpPr>
+          <p:nvPr>
+            <p:ph type="sldImg"/>
+          </p:nvPr>
+        </p:nvSpPr>
+        <p:spPr/>
+      </p:sp>
+      <p:sp>
+        <p:nvSpPr>
+          <p:cNvPr id="3" name="Notes Placeholder 2"/>
+          <p:cNvSpPr>
+            <a:spLocks noGrp="1"/>
+          </p:cNvSpPr>
+          <p:nvPr>
+            <p:ph type="body" idx="1"/>
+          </p:nvPr>
+        </p:nvSpPr>
+        <p:spPr/>
+        <p:txBody>
+          <a:bodyPr/>
+          <a:lstStyle/>
+          <a:p>
+            <a:r>
+              <a:rPr lang="en-US" dirty="0" smtClean="0"/>
+              <a:t>People in age group &gt; 75 years are found to be most Vulnerable of </a:t>
+            </a:r>
+            <a:r>
+              <a:rPr lang="en-US" dirty="0" err="1" smtClean="0"/>
+              <a:t>commiting</a:t>
+            </a:r>
+            <a:r>
+              <a:rPr lang="en-US" dirty="0" smtClean="0"/>
+              <a:t> Suicides. However, Youth in age group of 25 - 34 Years, are the majority in Count of </a:t>
+            </a:r>
+            <a:r>
+              <a:rPr lang="en-US" dirty="0" err="1" smtClean="0"/>
+              <a:t>commiting</a:t>
+            </a:r>
+            <a:r>
+              <a:rPr lang="en-US" dirty="0" smtClean="0"/>
+              <a:t> Suicides.</a:t>
+            </a:r>
+            <a:endParaRPr lang="en-US" dirty="0"/>
+          </a:p>
+        </p:txBody>
+      </p:sp>
+      <p:sp>
+        <p:nvSpPr>
+          <p:cNvPr id="4" name="Slide Number Placeholder 3"/>
+          <p:cNvSpPr>
+            <a:spLocks noGrp="1"/>
+          </p:cNvSpPr>
+          <p:nvPr>
+            <p:ph type="sldNum" sz="quarter" idx="10"/>
+          </p:nvPr>
+        </p:nvSpPr>
+        <p:spPr/>
+        <p:txBody>
+          <a:bodyPr/>
+          <a:lstStyle/>
+          <a:p>
+            <a:fld id="{321C9D84-9BB0-4ECD-B693-60559829FA29}" type="slidenum">
+              <a:rPr lang="en-US" smtClean="0"/>
+              <a:t>14</a:t>
+            </a:fld>
+            <a:endParaRPr lang="en-US"/>
+          </a:p>
+        </p:txBody>
+      </p:sp>
+    </p:spTree>
+    <p:extLst>
+      <p:ext uri="{BB962C8B-B14F-4D97-AF65-F5344CB8AC3E}">
+        <p14:creationId xmlns:p14="http://schemas.microsoft.com/office/powerpoint/2010/main" val="2485482861"/>
+      </p:ext>
+    </p:extLst>
+  </p:cSld>
+  <p:clrMapOvr>
+    <a:masterClrMapping/>
+  </p:clrMapOvr>
+</p:notes>
+</file>
+
+<file path=ppt/notesSlides/notesSlide12.xml><?xml version="1.0" encoding="utf-8"?>
+<p:notes xmlns:a="http://schemas.openxmlformats.org/drawingml/2006/main" xmlns:r="http://schemas.openxmlformats.org/officeDocument/2006/relationships" xmlns:p="http://schemas.openxmlformats.org/presentationml/2006/main">
+  <p:cSld>
+    <p:spTree>
+      <p:nvGrpSpPr>
+        <p:cNvPr id="1" name=""/>
+        <p:cNvGrpSpPr/>
+        <p:nvPr/>
+      </p:nvGrpSpPr>
+      <p:grpSpPr>
+        <a:xfrm>
+          <a:off x="0" y="0"/>
+          <a:ext cx="0" cy="0"/>
+          <a:chOff x="0" y="0"/>
+          <a:chExt cx="0" cy="0"/>
+        </a:xfrm>
+      </p:grpSpPr>
+      <p:sp>
+        <p:nvSpPr>
+          <p:cNvPr id="2" name="Slide Image Placeholder 1"/>
+          <p:cNvSpPr>
+            <a:spLocks noGrp="1" noRot="1" noChangeAspect="1"/>
+          </p:cNvSpPr>
+          <p:nvPr>
+            <p:ph type="sldImg"/>
+          </p:nvPr>
+        </p:nvSpPr>
+        <p:spPr/>
+      </p:sp>
+      <p:sp>
+        <p:nvSpPr>
+          <p:cNvPr id="3" name="Notes Placeholder 2"/>
+          <p:cNvSpPr>
+            <a:spLocks noGrp="1"/>
+          </p:cNvSpPr>
+          <p:nvPr>
+            <p:ph type="body" idx="1"/>
+          </p:nvPr>
+        </p:nvSpPr>
+        <p:spPr/>
+        <p:txBody>
+          <a:bodyPr/>
+          <a:lstStyle/>
+          <a:p>
+            <a:r>
+              <a:rPr lang="en-US" dirty="0" smtClean="0"/>
+              <a:t>People of Race = Other Non- White are most vulnerable towards committing Suicides, but Suicides appear to be in majority among the Whites.</a:t>
+            </a:r>
+          </a:p>
+          <a:p>
+            <a:r>
+              <a:rPr lang="en-US" dirty="0" smtClean="0"/>
+              <a:t>Whereas, comparatively,</a:t>
+            </a:r>
+            <a:r>
+              <a:rPr lang="en-US" baseline="0" dirty="0" smtClean="0"/>
+              <a:t> “American Indian or Alaskan” commits most of the Suicides proportionally.</a:t>
+            </a:r>
+            <a:endParaRPr lang="en-US" dirty="0"/>
+          </a:p>
+        </p:txBody>
+      </p:sp>
+      <p:sp>
+        <p:nvSpPr>
+          <p:cNvPr id="4" name="Slide Number Placeholder 3"/>
+          <p:cNvSpPr>
+            <a:spLocks noGrp="1"/>
+          </p:cNvSpPr>
+          <p:nvPr>
+            <p:ph type="sldNum" sz="quarter" idx="10"/>
+          </p:nvPr>
+        </p:nvSpPr>
+        <p:spPr/>
+        <p:txBody>
+          <a:bodyPr/>
+          <a:lstStyle/>
+          <a:p>
+            <a:fld id="{321C9D84-9BB0-4ECD-B693-60559829FA29}" type="slidenum">
+              <a:rPr lang="en-US" smtClean="0"/>
+              <a:t>15</a:t>
+            </a:fld>
+            <a:endParaRPr lang="en-US"/>
+          </a:p>
+        </p:txBody>
+      </p:sp>
+    </p:spTree>
+    <p:extLst>
+      <p:ext uri="{BB962C8B-B14F-4D97-AF65-F5344CB8AC3E}">
+        <p14:creationId xmlns:p14="http://schemas.microsoft.com/office/powerpoint/2010/main" val="2150226293"/>
+      </p:ext>
+    </p:extLst>
+  </p:cSld>
+  <p:clrMapOvr>
+    <a:masterClrMapping/>
+  </p:clrMapOvr>
+</p:notes>
+</file>
+
+<file path=ppt/notesSlides/notesSlide13.xml><?xml version="1.0" encoding="utf-8"?>
+<p:notes xmlns:a="http://schemas.openxmlformats.org/drawingml/2006/main" xmlns:r="http://schemas.openxmlformats.org/officeDocument/2006/relationships" xmlns:p="http://schemas.openxmlformats.org/presentationml/2006/main">
+  <p:cSld>
+    <p:spTree>
+      <p:nvGrpSpPr>
+        <p:cNvPr id="1" name=""/>
+        <p:cNvGrpSpPr/>
+        <p:nvPr/>
+      </p:nvGrpSpPr>
+      <p:grpSpPr>
+        <a:xfrm>
+          <a:off x="0" y="0"/>
+          <a:ext cx="0" cy="0"/>
+          <a:chOff x="0" y="0"/>
+          <a:chExt cx="0" cy="0"/>
+        </a:xfrm>
+      </p:grpSpPr>
+      <p:sp>
+        <p:nvSpPr>
+          <p:cNvPr id="2" name="Slide Image Placeholder 1"/>
+          <p:cNvSpPr>
+            <a:spLocks noGrp="1" noRot="1" noChangeAspect="1"/>
+          </p:cNvSpPr>
+          <p:nvPr>
+            <p:ph type="sldImg"/>
+          </p:nvPr>
+        </p:nvSpPr>
+        <p:spPr/>
+      </p:sp>
+      <p:sp>
+        <p:nvSpPr>
+          <p:cNvPr id="3" name="Notes Placeholder 2"/>
+          <p:cNvSpPr>
+            <a:spLocks noGrp="1"/>
+          </p:cNvSpPr>
+          <p:nvPr>
+            <p:ph type="body" idx="1"/>
+          </p:nvPr>
+        </p:nvSpPr>
+        <p:spPr/>
+        <p:txBody>
+          <a:bodyPr/>
+          <a:lstStyle/>
+          <a:p>
+            <a:r>
+              <a:rPr lang="en-US" dirty="0" smtClean="0"/>
+              <a:t>Males or Females are equally vulnerable towards </a:t>
+            </a:r>
+            <a:r>
+              <a:rPr lang="en-US" dirty="0" err="1" smtClean="0"/>
+              <a:t>commiting</a:t>
+            </a:r>
+            <a:r>
+              <a:rPr lang="en-US" dirty="0" smtClean="0"/>
+              <a:t> Suicide, but Males outnumber Females for the Stats.</a:t>
+            </a:r>
+            <a:endParaRPr lang="en-US" dirty="0"/>
+          </a:p>
+        </p:txBody>
+      </p:sp>
+      <p:sp>
+        <p:nvSpPr>
+          <p:cNvPr id="4" name="Slide Number Placeholder 3"/>
+          <p:cNvSpPr>
+            <a:spLocks noGrp="1"/>
+          </p:cNvSpPr>
+          <p:nvPr>
+            <p:ph type="sldNum" sz="quarter" idx="10"/>
+          </p:nvPr>
+        </p:nvSpPr>
+        <p:spPr/>
+        <p:txBody>
+          <a:bodyPr/>
+          <a:lstStyle/>
+          <a:p>
+            <a:fld id="{321C9D84-9BB0-4ECD-B693-60559829FA29}" type="slidenum">
+              <a:rPr lang="en-US" smtClean="0"/>
+              <a:t>16</a:t>
+            </a:fld>
+            <a:endParaRPr lang="en-US"/>
+          </a:p>
+        </p:txBody>
+      </p:sp>
+    </p:spTree>
+    <p:extLst>
+      <p:ext uri="{BB962C8B-B14F-4D97-AF65-F5344CB8AC3E}">
+        <p14:creationId xmlns:p14="http://schemas.microsoft.com/office/powerpoint/2010/main" val="1884273749"/>
+      </p:ext>
+    </p:extLst>
+  </p:cSld>
+  <p:clrMapOvr>
+    <a:masterClrMapping/>
+  </p:clrMapOvr>
+</p:notes>
+</file>
+
+<file path=ppt/notesSlides/notesSlide14.xml><?xml version="1.0" encoding="utf-8"?>
+<p:notes xmlns:a="http://schemas.openxmlformats.org/drawingml/2006/main" xmlns:r="http://schemas.openxmlformats.org/officeDocument/2006/relationships" xmlns:p="http://schemas.openxmlformats.org/presentationml/2006/main">
+  <p:cSld>
+    <p:spTree>
+      <p:nvGrpSpPr>
+        <p:cNvPr id="1" name=""/>
+        <p:cNvGrpSpPr/>
+        <p:nvPr/>
+      </p:nvGrpSpPr>
+      <p:grpSpPr>
+        <a:xfrm>
+          <a:off x="0" y="0"/>
+          <a:ext cx="0" cy="0"/>
+          <a:chOff x="0" y="0"/>
+          <a:chExt cx="0" cy="0"/>
+        </a:xfrm>
+      </p:grpSpPr>
+      <p:sp>
+        <p:nvSpPr>
+          <p:cNvPr id="2" name="Slide Image Placeholder 1"/>
+          <p:cNvSpPr>
+            <a:spLocks noGrp="1" noRot="1" noChangeAspect="1"/>
+          </p:cNvSpPr>
+          <p:nvPr>
+            <p:ph type="sldImg"/>
+          </p:nvPr>
+        </p:nvSpPr>
+        <p:spPr/>
+      </p:sp>
+      <p:sp>
+        <p:nvSpPr>
+          <p:cNvPr id="3" name="Notes Placeholder 2"/>
+          <p:cNvSpPr>
+            <a:spLocks noGrp="1"/>
+          </p:cNvSpPr>
+          <p:nvPr>
+            <p:ph type="body" idx="1"/>
+          </p:nvPr>
+        </p:nvSpPr>
+        <p:spPr/>
+        <p:txBody>
+          <a:bodyPr/>
+          <a:lstStyle/>
+          <a:p>
+            <a:r>
+              <a:rPr lang="en-US" dirty="0" smtClean="0"/>
+              <a:t>Let’s check out the impacts of getting Married, or staying</a:t>
+            </a:r>
+            <a:r>
+              <a:rPr lang="en-US" baseline="0" dirty="0" smtClean="0"/>
+              <a:t> a Bachelor drives people’s instincts towards Suicide.</a:t>
+            </a:r>
+            <a:endParaRPr lang="en-US" dirty="0"/>
+          </a:p>
+        </p:txBody>
+      </p:sp>
+      <p:sp>
+        <p:nvSpPr>
+          <p:cNvPr id="4" name="Slide Number Placeholder 3"/>
+          <p:cNvSpPr>
+            <a:spLocks noGrp="1"/>
+          </p:cNvSpPr>
+          <p:nvPr>
+            <p:ph type="sldNum" sz="quarter" idx="10"/>
+          </p:nvPr>
+        </p:nvSpPr>
+        <p:spPr/>
+        <p:txBody>
+          <a:bodyPr/>
+          <a:lstStyle/>
+          <a:p>
+            <a:fld id="{321C9D84-9BB0-4ECD-B693-60559829FA29}" type="slidenum">
+              <a:rPr lang="en-US" smtClean="0"/>
+              <a:t>17</a:t>
+            </a:fld>
+            <a:endParaRPr lang="en-US"/>
+          </a:p>
+        </p:txBody>
+      </p:sp>
+    </p:spTree>
+    <p:extLst>
+      <p:ext uri="{BB962C8B-B14F-4D97-AF65-F5344CB8AC3E}">
+        <p14:creationId xmlns:p14="http://schemas.microsoft.com/office/powerpoint/2010/main" val="1234044808"/>
+      </p:ext>
+    </p:extLst>
+  </p:cSld>
+  <p:clrMapOvr>
+    <a:masterClrMapping/>
+  </p:clrMapOvr>
+</p:notes>
+</file>
+
+<file path=ppt/notesSlides/notesSlide15.xml><?xml version="1.0" encoding="utf-8"?>
+<p:notes xmlns:a="http://schemas.openxmlformats.org/drawingml/2006/main" xmlns:r="http://schemas.openxmlformats.org/officeDocument/2006/relationships" xmlns:p="http://schemas.openxmlformats.org/presentationml/2006/main">
+  <p:cSld>
+    <p:spTree>
+      <p:nvGrpSpPr>
+        <p:cNvPr id="1" name=""/>
+        <p:cNvGrpSpPr/>
+        <p:nvPr/>
+      </p:nvGrpSpPr>
+      <p:grpSpPr>
+        <a:xfrm>
+          <a:off x="0" y="0"/>
+          <a:ext cx="0" cy="0"/>
+          <a:chOff x="0" y="0"/>
+          <a:chExt cx="0" cy="0"/>
+        </a:xfrm>
+      </p:grpSpPr>
+      <p:sp>
+        <p:nvSpPr>
+          <p:cNvPr id="2" name="Slide Image Placeholder 1"/>
+          <p:cNvSpPr>
+            <a:spLocks noGrp="1" noRot="1" noChangeAspect="1"/>
+          </p:cNvSpPr>
+          <p:nvPr>
+            <p:ph type="sldImg"/>
+          </p:nvPr>
+        </p:nvSpPr>
+        <p:spPr/>
+      </p:sp>
+      <p:sp>
+        <p:nvSpPr>
+          <p:cNvPr id="3" name="Notes Placeholder 2"/>
+          <p:cNvSpPr>
+            <a:spLocks noGrp="1"/>
+          </p:cNvSpPr>
+          <p:nvPr>
+            <p:ph type="body" idx="1"/>
+          </p:nvPr>
+        </p:nvSpPr>
+        <p:spPr/>
+        <p:txBody>
+          <a:bodyPr/>
+          <a:lstStyle/>
+          <a:p>
+            <a:r>
+              <a:rPr lang="en-US" dirty="0" smtClean="0"/>
+              <a:t>Subjects consist of majorly Married people, but Widowed are ones most Vulnerable.</a:t>
+            </a:r>
+            <a:endParaRPr lang="en-US" dirty="0"/>
+          </a:p>
+        </p:txBody>
+      </p:sp>
+      <p:sp>
+        <p:nvSpPr>
+          <p:cNvPr id="4" name="Slide Number Placeholder 3"/>
+          <p:cNvSpPr>
+            <a:spLocks noGrp="1"/>
+          </p:cNvSpPr>
+          <p:nvPr>
+            <p:ph type="sldNum" sz="quarter" idx="10"/>
+          </p:nvPr>
+        </p:nvSpPr>
+        <p:spPr/>
+        <p:txBody>
+          <a:bodyPr/>
+          <a:lstStyle/>
+          <a:p>
+            <a:fld id="{321C9D84-9BB0-4ECD-B693-60559829FA29}" type="slidenum">
+              <a:rPr lang="en-US" smtClean="0"/>
+              <a:t>18</a:t>
+            </a:fld>
+            <a:endParaRPr lang="en-US"/>
+          </a:p>
+        </p:txBody>
+      </p:sp>
+    </p:spTree>
+    <p:extLst>
+      <p:ext uri="{BB962C8B-B14F-4D97-AF65-F5344CB8AC3E}">
+        <p14:creationId xmlns:p14="http://schemas.microsoft.com/office/powerpoint/2010/main" val="3276782792"/>
+      </p:ext>
+    </p:extLst>
+  </p:cSld>
+  <p:clrMapOvr>
+    <a:masterClrMapping/>
+  </p:clrMapOvr>
+</p:notes>
+</file>
+
+<file path=ppt/notesSlides/notesSlide16.xml><?xml version="1.0" encoding="utf-8"?>
+<p:notes xmlns:a="http://schemas.openxmlformats.org/drawingml/2006/main" xmlns:r="http://schemas.openxmlformats.org/officeDocument/2006/relationships" xmlns:p="http://schemas.openxmlformats.org/presentationml/2006/main">
+  <p:cSld>
+    <p:spTree>
+      <p:nvGrpSpPr>
+        <p:cNvPr id="1" name=""/>
+        <p:cNvGrpSpPr/>
+        <p:nvPr/>
+      </p:nvGrpSpPr>
+      <p:grpSpPr>
+        <a:xfrm>
+          <a:off x="0" y="0"/>
+          <a:ext cx="0" cy="0"/>
+          <a:chOff x="0" y="0"/>
+          <a:chExt cx="0" cy="0"/>
+        </a:xfrm>
+      </p:grpSpPr>
+      <p:sp>
+        <p:nvSpPr>
+          <p:cNvPr id="2" name="Slide Image Placeholder 1"/>
+          <p:cNvSpPr>
+            <a:spLocks noGrp="1" noRot="1" noChangeAspect="1"/>
+          </p:cNvSpPr>
+          <p:nvPr>
+            <p:ph type="sldImg"/>
+          </p:nvPr>
+        </p:nvSpPr>
+        <p:spPr/>
+      </p:sp>
+      <p:sp>
+        <p:nvSpPr>
+          <p:cNvPr id="3" name="Notes Placeholder 2"/>
+          <p:cNvSpPr>
+            <a:spLocks noGrp="1"/>
+          </p:cNvSpPr>
+          <p:nvPr>
+            <p:ph type="body" idx="1"/>
+          </p:nvPr>
+        </p:nvSpPr>
+        <p:spPr/>
+        <p:txBody>
+          <a:bodyPr/>
+          <a:lstStyle/>
+          <a:p>
+            <a:endParaRPr lang="en-US" dirty="0"/>
+          </a:p>
+        </p:txBody>
+      </p:sp>
+      <p:sp>
+        <p:nvSpPr>
+          <p:cNvPr id="4" name="Slide Number Placeholder 3"/>
+          <p:cNvSpPr>
+            <a:spLocks noGrp="1"/>
+          </p:cNvSpPr>
+          <p:nvPr>
+            <p:ph type="sldNum" sz="quarter" idx="10"/>
+          </p:nvPr>
+        </p:nvSpPr>
+        <p:spPr/>
+        <p:txBody>
+          <a:bodyPr/>
+          <a:lstStyle/>
+          <a:p>
+            <a:fld id="{321C9D84-9BB0-4ECD-B693-60559829FA29}" type="slidenum">
+              <a:rPr lang="en-US" smtClean="0"/>
+              <a:t>19</a:t>
+            </a:fld>
+            <a:endParaRPr lang="en-US"/>
+          </a:p>
+        </p:txBody>
+      </p:sp>
+    </p:spTree>
+    <p:extLst>
+      <p:ext uri="{BB962C8B-B14F-4D97-AF65-F5344CB8AC3E}">
+        <p14:creationId xmlns:p14="http://schemas.microsoft.com/office/powerpoint/2010/main" val="1825984547"/>
+      </p:ext>
+    </p:extLst>
+  </p:cSld>
+  <p:clrMapOvr>
+    <a:masterClrMapping/>
+  </p:clrMapOvr>
+</p:notes>
+</file>
+
+<file path=ppt/notesSlides/notesSlide17.xml><?xml version="1.0" encoding="utf-8"?>
+<p:notes xmlns:a="http://schemas.openxmlformats.org/drawingml/2006/main" xmlns:r="http://schemas.openxmlformats.org/officeDocument/2006/relationships" xmlns:p="http://schemas.openxmlformats.org/presentationml/2006/main">
+  <p:cSld>
+    <p:spTree>
+      <p:nvGrpSpPr>
+        <p:cNvPr id="1" name=""/>
+        <p:cNvGrpSpPr/>
+        <p:nvPr/>
+      </p:nvGrpSpPr>
+      <p:grpSpPr>
+        <a:xfrm>
+          <a:off x="0" y="0"/>
+          <a:ext cx="0" cy="0"/>
+          <a:chOff x="0" y="0"/>
+          <a:chExt cx="0" cy="0"/>
+        </a:xfrm>
+      </p:grpSpPr>
+      <p:sp>
+        <p:nvSpPr>
+          <p:cNvPr id="2" name="Slide Image Placeholder 1"/>
+          <p:cNvSpPr>
+            <a:spLocks noGrp="1" noRot="1" noChangeAspect="1"/>
+          </p:cNvSpPr>
+          <p:nvPr>
+            <p:ph type="sldImg"/>
+          </p:nvPr>
+        </p:nvSpPr>
+        <p:spPr/>
+      </p:sp>
+      <p:sp>
+        <p:nvSpPr>
+          <p:cNvPr id="3" name="Notes Placeholder 2"/>
+          <p:cNvSpPr>
+            <a:spLocks noGrp="1"/>
+          </p:cNvSpPr>
+          <p:nvPr>
+            <p:ph type="body" idx="1"/>
+          </p:nvPr>
+        </p:nvSpPr>
+        <p:spPr/>
+        <p:txBody>
+          <a:bodyPr/>
+          <a:lstStyle/>
+          <a:p>
+            <a:r>
+              <a:rPr lang="en-US" dirty="0" smtClean="0"/>
+              <a:t>As</a:t>
+            </a:r>
+            <a:r>
+              <a:rPr lang="en-US" baseline="0" dirty="0" smtClean="0"/>
+              <a:t> we can see, most of the Subjects are those having a Job to work in. </a:t>
+            </a:r>
+          </a:p>
+          <a:p>
+            <a:r>
+              <a:rPr lang="en-US" baseline="0" dirty="0" smtClean="0"/>
+              <a:t>Employed people are those who form the majority for People with Best health conditions.</a:t>
+            </a:r>
+          </a:p>
+          <a:p>
+            <a:r>
+              <a:rPr lang="en-US" baseline="0" dirty="0" smtClean="0"/>
+              <a:t>Overall Deaths have been recorded for the Unemployed population, but Suicides are most committed by the </a:t>
+            </a:r>
+            <a:r>
+              <a:rPr lang="en-US" baseline="0" smtClean="0"/>
+              <a:t>Working Community.</a:t>
+            </a:r>
+            <a:endParaRPr lang="en-US" baseline="0" dirty="0" smtClean="0"/>
+          </a:p>
+          <a:p>
+            <a:endParaRPr lang="en-US" baseline="0" dirty="0" smtClean="0"/>
+          </a:p>
+          <a:p>
+            <a:r>
+              <a:rPr lang="en-US" baseline="0" dirty="0" smtClean="0"/>
+              <a:t>Could the Work pressure be driving this much of people towards Suicide?</a:t>
+            </a:r>
+          </a:p>
+          <a:p>
+            <a:endParaRPr lang="en-US" dirty="0"/>
+          </a:p>
+        </p:txBody>
+      </p:sp>
+      <p:sp>
+        <p:nvSpPr>
+          <p:cNvPr id="4" name="Slide Number Placeholder 3"/>
+          <p:cNvSpPr>
+            <a:spLocks noGrp="1"/>
+          </p:cNvSpPr>
+          <p:nvPr>
+            <p:ph type="sldNum" sz="quarter" idx="10"/>
+          </p:nvPr>
+        </p:nvSpPr>
+        <p:spPr/>
+        <p:txBody>
+          <a:bodyPr/>
+          <a:lstStyle/>
+          <a:p>
+            <a:fld id="{321C9D84-9BB0-4ECD-B693-60559829FA29}" type="slidenum">
+              <a:rPr lang="en-US" smtClean="0"/>
+              <a:t>20</a:t>
+            </a:fld>
+            <a:endParaRPr lang="en-US"/>
+          </a:p>
+        </p:txBody>
+      </p:sp>
+    </p:spTree>
+    <p:extLst>
+      <p:ext uri="{BB962C8B-B14F-4D97-AF65-F5344CB8AC3E}">
+        <p14:creationId xmlns:p14="http://schemas.microsoft.com/office/powerpoint/2010/main" val="2311509344"/>
+      </p:ext>
+    </p:extLst>
+  </p:cSld>
+  <p:clrMapOvr>
+    <a:masterClrMapping/>
+  </p:clrMapOvr>
+</p:notes>
+</file>
+
+<file path=ppt/notesSlides/notesSlide18.xml><?xml version="1.0" encoding="utf-8"?>
+<p:notes xmlns:a="http://schemas.openxmlformats.org/drawingml/2006/main" xmlns:r="http://schemas.openxmlformats.org/officeDocument/2006/relationships" xmlns:p="http://schemas.openxmlformats.org/presentationml/2006/main">
+  <p:cSld>
+    <p:spTree>
+      <p:nvGrpSpPr>
+        <p:cNvPr id="1" name=""/>
+        <p:cNvGrpSpPr/>
+        <p:nvPr/>
+      </p:nvGrpSpPr>
+      <p:grpSpPr>
+        <a:xfrm>
+          <a:off x="0" y="0"/>
+          <a:ext cx="0" cy="0"/>
+          <a:chOff x="0" y="0"/>
+          <a:chExt cx="0" cy="0"/>
+        </a:xfrm>
+      </p:grpSpPr>
+      <p:sp>
+        <p:nvSpPr>
+          <p:cNvPr id="2" name="Slide Image Placeholder 1"/>
+          <p:cNvSpPr>
+            <a:spLocks noGrp="1" noRot="1" noChangeAspect="1"/>
+          </p:cNvSpPr>
+          <p:nvPr>
+            <p:ph type="sldImg"/>
+          </p:nvPr>
+        </p:nvSpPr>
+        <p:spPr/>
+      </p:sp>
+      <p:sp>
+        <p:nvSpPr>
+          <p:cNvPr id="3" name="Notes Placeholder 2"/>
+          <p:cNvSpPr>
+            <a:spLocks noGrp="1"/>
+          </p:cNvSpPr>
+          <p:nvPr>
+            <p:ph type="body" idx="1"/>
+          </p:nvPr>
+        </p:nvSpPr>
+        <p:spPr/>
+        <p:txBody>
+          <a:bodyPr/>
+          <a:lstStyle/>
+          <a:p>
+            <a:r>
+              <a:rPr lang="en-US" dirty="0" smtClean="0"/>
+              <a:t>People living in Urban areas outnumber Rural population for Suicides.</a:t>
+            </a:r>
+          </a:p>
+          <a:p>
+            <a:r>
+              <a:rPr lang="en-US" dirty="0" smtClean="0"/>
+              <a:t>Subjects living in their Own Houses have been found in majority, whereas all are equally vulnerable towards committing the Act.</a:t>
+            </a:r>
+          </a:p>
+          <a:p>
+            <a:r>
+              <a:rPr lang="en-US" dirty="0" smtClean="0"/>
+              <a:t>People born in US are less resilient against Suicide, and are outnumbered by people Born Abroad.</a:t>
+            </a:r>
+            <a:endParaRPr lang="en-US" dirty="0"/>
+          </a:p>
+        </p:txBody>
+      </p:sp>
+      <p:sp>
+        <p:nvSpPr>
+          <p:cNvPr id="4" name="Slide Number Placeholder 3"/>
+          <p:cNvSpPr>
+            <a:spLocks noGrp="1"/>
+          </p:cNvSpPr>
+          <p:nvPr>
+            <p:ph type="sldNum" sz="quarter" idx="10"/>
+          </p:nvPr>
+        </p:nvSpPr>
+        <p:spPr/>
+        <p:txBody>
+          <a:bodyPr/>
+          <a:lstStyle/>
+          <a:p>
+            <a:fld id="{321C9D84-9BB0-4ECD-B693-60559829FA29}" type="slidenum">
+              <a:rPr lang="en-US" smtClean="0"/>
+              <a:t>22</a:t>
+            </a:fld>
+            <a:endParaRPr lang="en-US"/>
+          </a:p>
+        </p:txBody>
+      </p:sp>
+    </p:spTree>
+    <p:extLst>
+      <p:ext uri="{BB962C8B-B14F-4D97-AF65-F5344CB8AC3E}">
+        <p14:creationId xmlns:p14="http://schemas.microsoft.com/office/powerpoint/2010/main" val="1783875003"/>
+      </p:ext>
+    </p:extLst>
+  </p:cSld>
+  <p:clrMapOvr>
+    <a:masterClrMapping/>
+  </p:clrMapOvr>
+</p:notes>
+</file>
+
+<file path=ppt/notesSlides/notesSlide19.xml><?xml version="1.0" encoding="utf-8"?>
+<p:notes xmlns:a="http://schemas.openxmlformats.org/drawingml/2006/main" xmlns:r="http://schemas.openxmlformats.org/officeDocument/2006/relationships" xmlns:p="http://schemas.openxmlformats.org/presentationml/2006/main">
+  <p:cSld>
+    <p:spTree>
+      <p:nvGrpSpPr>
+        <p:cNvPr id="1" name=""/>
+        <p:cNvGrpSpPr/>
+        <p:nvPr/>
+      </p:nvGrpSpPr>
+      <p:grpSpPr>
+        <a:xfrm>
+          <a:off x="0" y="0"/>
+          <a:ext cx="0" cy="0"/>
+          <a:chOff x="0" y="0"/>
+          <a:chExt cx="0" cy="0"/>
+        </a:xfrm>
+      </p:grpSpPr>
+      <p:sp>
+        <p:nvSpPr>
+          <p:cNvPr id="2" name="Slide Image Placeholder 1"/>
+          <p:cNvSpPr>
+            <a:spLocks noGrp="1" noRot="1" noChangeAspect="1"/>
+          </p:cNvSpPr>
+          <p:nvPr>
+            <p:ph type="sldImg"/>
+          </p:nvPr>
+        </p:nvSpPr>
+        <p:spPr/>
+      </p:sp>
+      <p:sp>
+        <p:nvSpPr>
+          <p:cNvPr id="3" name="Notes Placeholder 2"/>
+          <p:cNvSpPr>
+            <a:spLocks noGrp="1"/>
+          </p:cNvSpPr>
+          <p:nvPr>
+            <p:ph type="body" idx="1"/>
+          </p:nvPr>
+        </p:nvSpPr>
+        <p:spPr/>
+        <p:txBody>
+          <a:bodyPr/>
+          <a:lstStyle/>
+          <a:p>
+            <a:r>
+              <a:rPr lang="en-US" dirty="0" smtClean="0"/>
+              <a:t>People with average health are least resilient but are outnumbered by people with Excellent Health.</a:t>
+            </a:r>
+          </a:p>
+          <a:p>
+            <a:r>
+              <a:rPr lang="en-US" dirty="0" smtClean="0"/>
+              <a:t>Healthy</a:t>
+            </a:r>
+            <a:r>
+              <a:rPr lang="en-US" baseline="0" dirty="0" smtClean="0"/>
+              <a:t> people committing Suicide must be counseled for they being definitely doing it against some Personal Tragedies.</a:t>
+            </a:r>
+            <a:endParaRPr lang="en-US" dirty="0"/>
+          </a:p>
+        </p:txBody>
+      </p:sp>
+      <p:sp>
+        <p:nvSpPr>
+          <p:cNvPr id="4" name="Slide Number Placeholder 3"/>
+          <p:cNvSpPr>
+            <a:spLocks noGrp="1"/>
+          </p:cNvSpPr>
+          <p:nvPr>
+            <p:ph type="sldNum" sz="quarter" idx="10"/>
+          </p:nvPr>
+        </p:nvSpPr>
+        <p:spPr/>
+        <p:txBody>
+          <a:bodyPr/>
+          <a:lstStyle/>
+          <a:p>
+            <a:fld id="{321C9D84-9BB0-4ECD-B693-60559829FA29}" type="slidenum">
+              <a:rPr lang="en-US" smtClean="0"/>
+              <a:t>23</a:t>
+            </a:fld>
+            <a:endParaRPr lang="en-US"/>
+          </a:p>
+        </p:txBody>
+      </p:sp>
+    </p:spTree>
+    <p:extLst>
+      <p:ext uri="{BB962C8B-B14F-4D97-AF65-F5344CB8AC3E}">
+        <p14:creationId xmlns:p14="http://schemas.microsoft.com/office/powerpoint/2010/main" val="483436716"/>
       </p:ext>
     </p:extLst>
   </p:cSld>
@@ -658,7 +1643,7 @@
           <a:p>
             <a:fld id="{321C9D84-9BB0-4ECD-B693-60559829FA29}" type="slidenum">
               <a:rPr lang="en-US" smtClean="0"/>
-              <a:t>3</a:t>
+              <a:t>4</a:t>
             </a:fld>
             <a:endParaRPr lang="en-US"/>
           </a:p>
@@ -750,7 +1735,7 @@
           <a:p>
             <a:fld id="{321C9D84-9BB0-4ECD-B693-60559829FA29}" type="slidenum">
               <a:rPr lang="en-US" smtClean="0"/>
-              <a:t>4</a:t>
+              <a:t>5</a:t>
             </a:fld>
             <a:endParaRPr lang="en-US"/>
           </a:p>
@@ -815,15 +1800,7 @@
           <a:p>
             <a:r>
               <a:rPr lang="en-US" dirty="0" smtClean="0"/>
-              <a:t>Most of the Suicides have been found by people who are not a member of any </a:t>
-            </a:r>
-            <a:r>
-              <a:rPr lang="en-US" dirty="0" err="1" smtClean="0"/>
-              <a:t>Defence</a:t>
-            </a:r>
-            <a:r>
-              <a:rPr lang="en-US" dirty="0" smtClean="0"/>
-              <a:t> Forces.</a:t>
+              <a:t>Most of the Suicides have been found by people who are not a member of any Defense Forces.</a:t>
             </a:r>
             <a:br>
               <a:rPr lang="en-US" dirty="0" smtClean="0"/>
@@ -852,7 +1829,7 @@
           <a:p>
             <a:fld id="{321C9D84-9BB0-4ECD-B693-60559829FA29}" type="slidenum">
               <a:rPr lang="en-US" smtClean="0"/>
-              <a:t>5</a:t>
+              <a:t>6</a:t>
             </a:fld>
             <a:endParaRPr lang="en-US"/>
           </a:p>
@@ -939,20 +1916,10 @@
                 <a:ea typeface="+mn-ea"/>
                 <a:cs typeface="+mn-cs"/>
               </a:rPr>
-              <a:t>Can Government authorities do something here by </a:t>
-            </a:r>
-            <a:r>
-              <a:rPr lang="en-US" sz="1200" b="0" i="0" kern="1200" dirty="0" err="1" smtClean="0">
-                <a:solidFill>
-                  <a:schemeClr val="tx1"/>
-                </a:solidFill>
-                <a:effectLst/>
-                <a:latin typeface="+mn-lt"/>
-                <a:ea typeface="+mn-ea"/>
-                <a:cs typeface="+mn-cs"/>
-              </a:rPr>
-              <a:t>initiaitng</a:t>
-            </a:r>
+              <a:t>Can Government authorities do something here by initiating a Counseling with the Veterans to help them out?</a:t>
+            </a:r>
+          </a:p>
+          <a:p>
             <a:r>
               <a:rPr lang="en-US" sz="1200" b="0" i="0" kern="1200" dirty="0" smtClean="0">
                 <a:solidFill>
@@ -963,20 +1930,10 @@
                 <a:ea typeface="+mn-ea"/>
                 <a:cs typeface="+mn-cs"/>
               </a:rPr>
-              <a:t> a </a:t>
-            </a:r>
-            <a:r>
-              <a:rPr lang="en-US" sz="1200" b="0" i="0" kern="1200" dirty="0" err="1" smtClean="0">
-                <a:solidFill>
-                  <a:schemeClr val="tx1"/>
-                </a:solidFill>
-                <a:effectLst/>
-                <a:latin typeface="+mn-lt"/>
-                <a:ea typeface="+mn-ea"/>
-                <a:cs typeface="+mn-cs"/>
-              </a:rPr>
-              <a:t>Counselling</a:t>
-            </a:r>
+              <a:t>Disabled people with Poor Health also seem to be contributing towards Suicide.</a:t>
+            </a:r>
+          </a:p>
+          <a:p>
             <a:r>
               <a:rPr lang="en-US" sz="1200" b="0" i="0" kern="1200" dirty="0" smtClean="0">
                 <a:solidFill>
@@ -987,83 +1944,7 @@
                 <a:ea typeface="+mn-ea"/>
                 <a:cs typeface="+mn-cs"/>
               </a:rPr>
-              <a:t> with the Veterans to help them out?</a:t>
-            </a:r>
-          </a:p>
-          <a:p>
-            <a:r>
-              <a:rPr lang="en-US" sz="1200" b="0" i="0" kern="1200" dirty="0" smtClean="0">
-                <a:solidFill>
-                  <a:schemeClr val="tx1"/>
-                </a:solidFill>
-                <a:effectLst/>
-                <a:latin typeface="+mn-lt"/>
-                <a:ea typeface="+mn-ea"/>
-                <a:cs typeface="+mn-cs"/>
-              </a:rPr>
-              <a:t>Disabled people with Poor Health also seem to be </a:t>
-            </a:r>
-            <a:r>
-              <a:rPr lang="en-US" sz="1200" b="0" i="0" kern="1200" dirty="0" err="1" smtClean="0">
-                <a:solidFill>
-                  <a:schemeClr val="tx1"/>
-                </a:solidFill>
-                <a:effectLst/>
-                <a:latin typeface="+mn-lt"/>
-                <a:ea typeface="+mn-ea"/>
-                <a:cs typeface="+mn-cs"/>
-              </a:rPr>
-              <a:t>conrtibuting</a:t>
-            </a:r>
-            <a:r>
-              <a:rPr lang="en-US" sz="1200" b="0" i="0" kern="1200" dirty="0" smtClean="0">
-                <a:solidFill>
-                  <a:schemeClr val="tx1"/>
-                </a:solidFill>
-                <a:effectLst/>
-                <a:latin typeface="+mn-lt"/>
-                <a:ea typeface="+mn-ea"/>
-                <a:cs typeface="+mn-cs"/>
-              </a:rPr>
-              <a:t> towards Suicide.</a:t>
-            </a:r>
-          </a:p>
-          <a:p>
-            <a:r>
-              <a:rPr lang="en-US" sz="1200" b="0" i="0" kern="1200" dirty="0" smtClean="0">
-                <a:solidFill>
-                  <a:schemeClr val="tx1"/>
-                </a:solidFill>
-                <a:effectLst/>
-                <a:latin typeface="+mn-lt"/>
-                <a:ea typeface="+mn-ea"/>
-                <a:cs typeface="+mn-cs"/>
-              </a:rPr>
-              <a:t>Their Disability be due to any harm for their participation in any War. Could </a:t>
-            </a:r>
-            <a:r>
-              <a:rPr lang="en-US" sz="1200" b="0" i="0" kern="1200" dirty="0" err="1" smtClean="0">
-                <a:solidFill>
-                  <a:schemeClr val="tx1"/>
-                </a:solidFill>
-                <a:effectLst/>
-                <a:latin typeface="+mn-lt"/>
-                <a:ea typeface="+mn-ea"/>
-                <a:cs typeface="+mn-cs"/>
-              </a:rPr>
-              <a:t>Goverment</a:t>
-            </a:r>
-            <a:r>
-              <a:rPr lang="en-US" sz="1200" b="0" i="0" kern="1200" dirty="0" smtClean="0">
-                <a:solidFill>
-                  <a:schemeClr val="tx1"/>
-                </a:solidFill>
-                <a:effectLst/>
-                <a:latin typeface="+mn-lt"/>
-                <a:ea typeface="+mn-ea"/>
-                <a:cs typeface="+mn-cs"/>
-              </a:rPr>
-              <a:t> authorities taking better Care of them help out from losing their Lives?</a:t>
+              <a:t>Their Disability be due to any harm for their participation in any War. Could Government authorities taking better Care of them help out from losing their Lives?</a:t>
             </a:r>
           </a:p>
           <a:p>
@@ -1119,55 +2000,7 @@
                 <a:ea typeface="+mn-ea"/>
                 <a:cs typeface="+mn-cs"/>
               </a:rPr>
-              <a:t>Could Marriages, losing the Partner or divorce be a factor leading People into some personal issues, eventually taking a toll on mental Health? If yes, Married/ Divorced/ Widowed people could be </a:t>
-            </a:r>
-            <a:r>
-              <a:rPr lang="en-US" sz="1200" b="0" i="0" kern="1200" dirty="0" err="1" smtClean="0">
-                <a:solidFill>
-                  <a:schemeClr val="tx1"/>
-                </a:solidFill>
-                <a:effectLst/>
-                <a:latin typeface="+mn-lt"/>
-                <a:ea typeface="+mn-ea"/>
-                <a:cs typeface="+mn-cs"/>
-              </a:rPr>
-              <a:t>focussed</a:t>
-            </a:r>
-            <a:r>
-              <a:rPr lang="en-US" sz="1200" b="0" i="0" kern="1200" dirty="0" smtClean="0">
-                <a:solidFill>
-                  <a:schemeClr val="tx1"/>
-                </a:solidFill>
-                <a:effectLst/>
-                <a:latin typeface="+mn-lt"/>
-                <a:ea typeface="+mn-ea"/>
-                <a:cs typeface="+mn-cs"/>
-              </a:rPr>
-              <a:t> to undergo some </a:t>
-            </a:r>
-            <a:r>
-              <a:rPr lang="en-US" sz="1200" b="0" i="0" kern="1200" dirty="0" err="1" smtClean="0">
-                <a:solidFill>
-                  <a:schemeClr val="tx1"/>
-                </a:solidFill>
-                <a:effectLst/>
-                <a:latin typeface="+mn-lt"/>
-                <a:ea typeface="+mn-ea"/>
-                <a:cs typeface="+mn-cs"/>
-              </a:rPr>
-              <a:t>Counselling</a:t>
-            </a:r>
-            <a:r>
-              <a:rPr lang="en-US" sz="1200" b="0" i="0" kern="1200" dirty="0" smtClean="0">
-                <a:solidFill>
-                  <a:schemeClr val="tx1"/>
-                </a:solidFill>
-                <a:effectLst/>
-                <a:latin typeface="+mn-lt"/>
-                <a:ea typeface="+mn-ea"/>
-                <a:cs typeface="+mn-cs"/>
-              </a:rPr>
-              <a:t> sessions to help them out.</a:t>
+              <a:t>Could Marriages, losing the Partner or divorce be a factor leading People into some personal issues, eventually taking a toll on mental Health? If yes, Married/ Divorced/ Widowed people could be focused to undergo some Counseling sessions to help them out.</a:t>
             </a:r>
           </a:p>
           <a:p>
@@ -1192,7 +2025,7 @@
           <a:p>
             <a:fld id="{321C9D84-9BB0-4ECD-B693-60559829FA29}" type="slidenum">
               <a:rPr lang="en-US" smtClean="0"/>
-              <a:t>6</a:t>
+              <a:t>7</a:t>
             </a:fld>
             <a:endParaRPr lang="en-US"/>
           </a:p>
@@ -1304,7 +2137,7 @@
           <a:p>
             <a:fld id="{321C9D84-9BB0-4ECD-B693-60559829FA29}" type="slidenum">
               <a:rPr lang="en-US" smtClean="0"/>
-              <a:t>7</a:t>
+              <a:t>8</a:t>
             </a:fld>
             <a:endParaRPr lang="en-US"/>
           </a:p>
@@ -1369,15 +2202,7 @@
           <a:p>
             <a:r>
               <a:rPr lang="en-US" dirty="0" smtClean="0"/>
-              <a:t>The data shows that Whites are the ones committing most of the Suicides, but </a:t>
-            </a:r>
-            <a:r>
-              <a:rPr lang="en-US" dirty="0" err="1" smtClean="0"/>
-              <a:t>comparitively</a:t>
-            </a:r>
-            <a:r>
-              <a:rPr lang="en-US" dirty="0" smtClean="0"/>
-              <a:t> there is more %age of the 'American Indian or Alaskan' population committing Suicides.</a:t>
+              <a:t>The data shows that Whites are the ones committing most of the Suicides, but comparatively there is more %age of the 'American Indian or Alaskan' population committing Suicides.</a:t>
             </a:r>
             <a:endParaRPr lang="en-US" dirty="0"/>
           </a:p>
@@ -1400,7 +2225,7 @@
           <a:p>
             <a:fld id="{321C9D84-9BB0-4ECD-B693-60559829FA29}" type="slidenum">
               <a:rPr lang="en-US" smtClean="0"/>
-              <a:t>8</a:t>
+              <a:t>9</a:t>
             </a:fld>
             <a:endParaRPr lang="en-US"/>
           </a:p>
@@ -1510,449 +2335,6 @@
               <a:rPr lang="en-US" dirty="0" smtClean="0"/>
               <a:t>People educated till High School level 4 and having Salary less than 25k are the majority among Subjects.</a:t>
             </a:r>
-            <a:br>
-              <a:rPr lang="en-US" dirty="0" smtClean="0"/>
-            </a:br>
-            <a:endParaRPr lang="en-US" dirty="0" smtClean="0"/>
-          </a:p>
-          <a:p>
-            <a:pPr marL="0" marR="0" indent="0" algn="l" defTabSz="914400" rtl="0" eaLnBrk="1" fontAlgn="auto" latinLnBrk="0" hangingPunct="1">
-              <a:lnSpc>
-                <a:spcPct val="100000"/>
-              </a:lnSpc>
-              <a:spcBef>
-                <a:spcPts val="0"/>
-              </a:spcBef>
-              <a:spcAft>
-                <a:spcPts val="0"/>
-              </a:spcAft>
-              <a:buClrTx/>
-              <a:buSzTx/>
-              <a:buFontTx/>
-              <a:buNone/>
-              <a:tabLst/>
-              <a:defRPr/>
-            </a:pPr>
-            <a:endParaRPr lang="en-US" dirty="0" smtClean="0"/>
-          </a:p>
-          <a:p>
-            <a:pPr marL="0" marR="0" indent="0" algn="l" defTabSz="914400" rtl="0" eaLnBrk="1" fontAlgn="auto" latinLnBrk="0" hangingPunct="1">
-              <a:lnSpc>
-                <a:spcPct val="100000"/>
-              </a:lnSpc>
-              <a:spcBef>
-                <a:spcPts val="0"/>
-              </a:spcBef>
-              <a:spcAft>
-                <a:spcPts val="0"/>
-              </a:spcAft>
-              <a:buClrTx/>
-              <a:buSzTx/>
-              <a:buFontTx/>
-              <a:buNone/>
-              <a:tabLst/>
-              <a:defRPr/>
-            </a:pPr>
-            <a:r>
-              <a:rPr lang="en-US" dirty="0" smtClean="0"/>
-              <a:t>1. People below age of 35 years, having Excellent health, may be facing difficulties with their Intellectual Health.</a:t>
-            </a:r>
-          </a:p>
-          <a:p>
-            <a:pPr marL="0" marR="0" indent="0" algn="l" defTabSz="914400" rtl="0" eaLnBrk="1" fontAlgn="auto" latinLnBrk="0" hangingPunct="1">
-              <a:lnSpc>
-                <a:spcPct val="100000"/>
-              </a:lnSpc>
-              <a:spcBef>
-                <a:spcPts val="0"/>
-              </a:spcBef>
-              <a:spcAft>
-                <a:spcPts val="0"/>
-              </a:spcAft>
-              <a:buClrTx/>
-              <a:buSzTx/>
-              <a:buFontTx/>
-              <a:buNone/>
-              <a:tabLst/>
-              <a:defRPr/>
-            </a:pPr>
-            <a:endParaRPr lang="en-US" dirty="0" smtClean="0"/>
-          </a:p>
-          <a:p>
-            <a:pPr marL="0" marR="0" indent="0" algn="l" defTabSz="914400" rtl="0" eaLnBrk="1" fontAlgn="auto" latinLnBrk="0" hangingPunct="1">
-              <a:lnSpc>
-                <a:spcPct val="100000"/>
-              </a:lnSpc>
-              <a:spcBef>
-                <a:spcPts val="0"/>
-              </a:spcBef>
-              <a:spcAft>
-                <a:spcPts val="0"/>
-              </a:spcAft>
-              <a:buClrTx/>
-              <a:buSzTx/>
-              <a:buFontTx/>
-              <a:buNone/>
-              <a:tabLst/>
-              <a:defRPr/>
-            </a:pPr>
-            <a:r>
-              <a:rPr lang="en-US" dirty="0" smtClean="0"/>
-              <a:t>Can Government authorities do something here by </a:t>
-            </a:r>
-            <a:r>
-              <a:rPr lang="en-US" dirty="0" err="1" smtClean="0"/>
-              <a:t>initiaitng</a:t>
-            </a:r>
-            <a:r>
-              <a:rPr lang="en-US" dirty="0" smtClean="0"/>
-              <a:t> a </a:t>
-            </a:r>
-            <a:r>
-              <a:rPr lang="en-US" dirty="0" err="1" smtClean="0"/>
-              <a:t>Counselling</a:t>
-            </a:r>
-            <a:r>
-              <a:rPr lang="en-US" dirty="0" smtClean="0"/>
-              <a:t> with the Veterans to help them out?</a:t>
-            </a:r>
-          </a:p>
-          <a:p>
-            <a:pPr marL="0" marR="0" indent="0" algn="l" defTabSz="914400" rtl="0" eaLnBrk="1" fontAlgn="auto" latinLnBrk="0" hangingPunct="1">
-              <a:lnSpc>
-                <a:spcPct val="100000"/>
-              </a:lnSpc>
-              <a:spcBef>
-                <a:spcPts val="0"/>
-              </a:spcBef>
-              <a:spcAft>
-                <a:spcPts val="0"/>
-              </a:spcAft>
-              <a:buClrTx/>
-              <a:buSzTx/>
-              <a:buFontTx/>
-              <a:buNone/>
-              <a:tabLst/>
-              <a:defRPr/>
-            </a:pPr>
-            <a:endParaRPr lang="en-US" dirty="0" smtClean="0"/>
-          </a:p>
-          <a:p>
-            <a:pPr marL="0" marR="0" indent="0" algn="l" defTabSz="914400" rtl="0" eaLnBrk="1" fontAlgn="auto" latinLnBrk="0" hangingPunct="1">
-              <a:lnSpc>
-                <a:spcPct val="100000"/>
-              </a:lnSpc>
-              <a:spcBef>
-                <a:spcPts val="0"/>
-              </a:spcBef>
-              <a:spcAft>
-                <a:spcPts val="0"/>
-              </a:spcAft>
-              <a:buClrTx/>
-              <a:buSzTx/>
-              <a:buFontTx/>
-              <a:buNone/>
-              <a:tabLst/>
-              <a:defRPr/>
-            </a:pPr>
-            <a:r>
-              <a:rPr lang="en-US" dirty="0" smtClean="0"/>
-              <a:t>2. Disabled people with Poor Health also seem to be </a:t>
-            </a:r>
-            <a:r>
-              <a:rPr lang="en-US" dirty="0" err="1" smtClean="0"/>
-              <a:t>conrtibuting</a:t>
-            </a:r>
-            <a:r>
-              <a:rPr lang="en-US" dirty="0" smtClean="0"/>
-              <a:t> towards Suicide.</a:t>
-            </a:r>
-          </a:p>
-          <a:p>
-            <a:pPr marL="0" marR="0" indent="0" algn="l" defTabSz="914400" rtl="0" eaLnBrk="1" fontAlgn="auto" latinLnBrk="0" hangingPunct="1">
-              <a:lnSpc>
-                <a:spcPct val="100000"/>
-              </a:lnSpc>
-              <a:spcBef>
-                <a:spcPts val="0"/>
-              </a:spcBef>
-              <a:spcAft>
-                <a:spcPts val="0"/>
-              </a:spcAft>
-              <a:buClrTx/>
-              <a:buSzTx/>
-              <a:buFontTx/>
-              <a:buNone/>
-              <a:tabLst/>
-              <a:defRPr/>
-            </a:pPr>
-            <a:endParaRPr lang="en-US" dirty="0" smtClean="0"/>
-          </a:p>
-          <a:p>
-            <a:pPr marL="0" marR="0" indent="0" algn="l" defTabSz="914400" rtl="0" eaLnBrk="1" fontAlgn="auto" latinLnBrk="0" hangingPunct="1">
-              <a:lnSpc>
-                <a:spcPct val="100000"/>
-              </a:lnSpc>
-              <a:spcBef>
-                <a:spcPts val="0"/>
-              </a:spcBef>
-              <a:spcAft>
-                <a:spcPts val="0"/>
-              </a:spcAft>
-              <a:buClrTx/>
-              <a:buSzTx/>
-              <a:buFontTx/>
-              <a:buNone/>
-              <a:tabLst/>
-              <a:defRPr/>
-            </a:pPr>
-            <a:r>
-              <a:rPr lang="en-US" dirty="0" smtClean="0"/>
-              <a:t>Their Disability be due to any harm for their participation in any War. Could </a:t>
-            </a:r>
-            <a:r>
-              <a:rPr lang="en-US" dirty="0" err="1" smtClean="0"/>
-              <a:t>Goverment</a:t>
-            </a:r>
-            <a:r>
-              <a:rPr lang="en-US" dirty="0" smtClean="0"/>
-              <a:t> authorities taking better Care of them help out from losing their Lives?</a:t>
-            </a:r>
-          </a:p>
-          <a:p>
-            <a:pPr marL="0" marR="0" indent="0" algn="l" defTabSz="914400" rtl="0" eaLnBrk="1" fontAlgn="auto" latinLnBrk="0" hangingPunct="1">
-              <a:lnSpc>
-                <a:spcPct val="100000"/>
-              </a:lnSpc>
-              <a:spcBef>
-                <a:spcPts val="0"/>
-              </a:spcBef>
-              <a:spcAft>
-                <a:spcPts val="0"/>
-              </a:spcAft>
-              <a:buClrTx/>
-              <a:buSzTx/>
-              <a:buFontTx/>
-              <a:buNone/>
-              <a:tabLst/>
-              <a:defRPr/>
-            </a:pPr>
-            <a:endParaRPr lang="en-US" dirty="0" smtClean="0"/>
-          </a:p>
-          <a:p>
-            <a:pPr marL="0" marR="0" indent="0" algn="l" defTabSz="914400" rtl="0" eaLnBrk="1" fontAlgn="auto" latinLnBrk="0" hangingPunct="1">
-              <a:lnSpc>
-                <a:spcPct val="100000"/>
-              </a:lnSpc>
-              <a:spcBef>
-                <a:spcPts val="0"/>
-              </a:spcBef>
-              <a:spcAft>
-                <a:spcPts val="0"/>
-              </a:spcAft>
-              <a:buClrTx/>
-              <a:buSzTx/>
-              <a:buFontTx/>
-              <a:buNone/>
-              <a:tabLst/>
-              <a:defRPr/>
-            </a:pPr>
-            <a:r>
-              <a:rPr lang="en-US" dirty="0" smtClean="0"/>
-              <a:t>3. People with Income &lt; 25k form the majority.</a:t>
-            </a:r>
-          </a:p>
-          <a:p>
-            <a:pPr marL="0" marR="0" indent="0" algn="l" defTabSz="914400" rtl="0" eaLnBrk="1" fontAlgn="auto" latinLnBrk="0" hangingPunct="1">
-              <a:lnSpc>
-                <a:spcPct val="100000"/>
-              </a:lnSpc>
-              <a:spcBef>
-                <a:spcPts val="0"/>
-              </a:spcBef>
-              <a:spcAft>
-                <a:spcPts val="0"/>
-              </a:spcAft>
-              <a:buClrTx/>
-              <a:buSzTx/>
-              <a:buFontTx/>
-              <a:buNone/>
-              <a:tabLst/>
-              <a:defRPr/>
-            </a:pPr>
-            <a:endParaRPr lang="en-US" dirty="0" smtClean="0"/>
-          </a:p>
-          <a:p>
-            <a:pPr marL="0" marR="0" indent="0" algn="l" defTabSz="914400" rtl="0" eaLnBrk="1" fontAlgn="auto" latinLnBrk="0" hangingPunct="1">
-              <a:lnSpc>
-                <a:spcPct val="100000"/>
-              </a:lnSpc>
-              <a:spcBef>
-                <a:spcPts val="0"/>
-              </a:spcBef>
-              <a:spcAft>
-                <a:spcPts val="0"/>
-              </a:spcAft>
-              <a:buClrTx/>
-              <a:buSzTx/>
-              <a:buFontTx/>
-              <a:buNone/>
-              <a:tabLst/>
-              <a:defRPr/>
-            </a:pPr>
-            <a:r>
-              <a:rPr lang="en-US" dirty="0" smtClean="0"/>
-              <a:t>Could Government increasing their Wages help them out from taking such actions?</a:t>
-            </a:r>
-          </a:p>
-          <a:p>
-            <a:pPr marL="0" marR="0" indent="0" algn="l" defTabSz="914400" rtl="0" eaLnBrk="1" fontAlgn="auto" latinLnBrk="0" hangingPunct="1">
-              <a:lnSpc>
-                <a:spcPct val="100000"/>
-              </a:lnSpc>
-              <a:spcBef>
-                <a:spcPts val="0"/>
-              </a:spcBef>
-              <a:spcAft>
-                <a:spcPts val="0"/>
-              </a:spcAft>
-              <a:buClrTx/>
-              <a:buSzTx/>
-              <a:buFontTx/>
-              <a:buNone/>
-              <a:tabLst/>
-              <a:defRPr/>
-            </a:pPr>
-            <a:endParaRPr lang="en-US" dirty="0" smtClean="0"/>
-          </a:p>
-          <a:p>
-            <a:pPr marL="0" marR="0" indent="0" algn="l" defTabSz="914400" rtl="0" eaLnBrk="1" fontAlgn="auto" latinLnBrk="0" hangingPunct="1">
-              <a:lnSpc>
-                <a:spcPct val="100000"/>
-              </a:lnSpc>
-              <a:spcBef>
-                <a:spcPts val="0"/>
-              </a:spcBef>
-              <a:spcAft>
-                <a:spcPts val="0"/>
-              </a:spcAft>
-              <a:buClrTx/>
-              <a:buSzTx/>
-              <a:buFontTx/>
-              <a:buNone/>
-              <a:tabLst/>
-              <a:defRPr/>
-            </a:pPr>
-            <a:r>
-              <a:rPr lang="en-US" dirty="0" smtClean="0"/>
-              <a:t>4. Never Married, and Separated are the least amongst Veterans. </a:t>
-            </a:r>
-          </a:p>
-          <a:p>
-            <a:pPr marL="0" marR="0" indent="0" algn="l" defTabSz="914400" rtl="0" eaLnBrk="1" fontAlgn="auto" latinLnBrk="0" hangingPunct="1">
-              <a:lnSpc>
-                <a:spcPct val="100000"/>
-              </a:lnSpc>
-              <a:spcBef>
-                <a:spcPts val="0"/>
-              </a:spcBef>
-              <a:spcAft>
-                <a:spcPts val="0"/>
-              </a:spcAft>
-              <a:buClrTx/>
-              <a:buSzTx/>
-              <a:buFontTx/>
-              <a:buNone/>
-              <a:tabLst/>
-              <a:defRPr/>
-            </a:pPr>
-            <a:endParaRPr lang="en-US" dirty="0" smtClean="0"/>
-          </a:p>
-          <a:p>
-            <a:pPr marL="0" marR="0" indent="0" algn="l" defTabSz="914400" rtl="0" eaLnBrk="1" fontAlgn="auto" latinLnBrk="0" hangingPunct="1">
-              <a:lnSpc>
-                <a:spcPct val="100000"/>
-              </a:lnSpc>
-              <a:spcBef>
-                <a:spcPts val="0"/>
-              </a:spcBef>
-              <a:spcAft>
-                <a:spcPts val="0"/>
-              </a:spcAft>
-              <a:buClrTx/>
-              <a:buSzTx/>
-              <a:buFontTx/>
-              <a:buNone/>
-              <a:tabLst/>
-              <a:defRPr/>
-            </a:pPr>
-            <a:r>
-              <a:rPr lang="en-US" dirty="0" smtClean="0"/>
-              <a:t>  Could Marriages, losing the Partner or divorce be a factor leading People into some personal issues, eventually taking a toll on mental Health?</a:t>
-            </a:r>
-          </a:p>
-          <a:p>
-            <a:pPr marL="0" marR="0" indent="0" algn="l" defTabSz="914400" rtl="0" eaLnBrk="1" fontAlgn="auto" latinLnBrk="0" hangingPunct="1">
-              <a:lnSpc>
-                <a:spcPct val="100000"/>
-              </a:lnSpc>
-              <a:spcBef>
-                <a:spcPts val="0"/>
-              </a:spcBef>
-              <a:spcAft>
-                <a:spcPts val="0"/>
-              </a:spcAft>
-              <a:buClrTx/>
-              <a:buSzTx/>
-              <a:buFontTx/>
-              <a:buNone/>
-              <a:tabLst/>
-              <a:defRPr/>
-            </a:pPr>
-            <a:r>
-              <a:rPr lang="en-US" dirty="0" smtClean="0"/>
-              <a:t>  If yes, Married/ Divorced/ Widowed people could be </a:t>
-            </a:r>
-            <a:r>
-              <a:rPr lang="en-US" dirty="0" err="1" smtClean="0"/>
-              <a:t>focussed</a:t>
-            </a:r>
-            <a:r>
-              <a:rPr lang="en-US" dirty="0" smtClean="0"/>
-              <a:t> to undergo some </a:t>
-            </a:r>
-            <a:r>
-              <a:rPr lang="en-US" dirty="0" err="1" smtClean="0"/>
-              <a:t>Counselling</a:t>
-            </a:r>
-            <a:r>
-              <a:rPr lang="en-US" smtClean="0"/>
-              <a:t> sessions to help them out.</a:t>
-            </a:r>
-            <a:endParaRPr lang="en-US" dirty="0" smtClean="0"/>
-          </a:p>
-          <a:p>
-            <a:pPr marL="0" marR="0" indent="0" algn="l" defTabSz="914400" rtl="0" eaLnBrk="1" fontAlgn="auto" latinLnBrk="0" hangingPunct="1">
-              <a:lnSpc>
-                <a:spcPct val="100000"/>
-              </a:lnSpc>
-              <a:spcBef>
-                <a:spcPts val="0"/>
-              </a:spcBef>
-              <a:spcAft>
-                <a:spcPts val="0"/>
-              </a:spcAft>
-              <a:buClrTx/>
-              <a:buSzTx/>
-              <a:buFontTx/>
-              <a:buNone/>
-              <a:tabLst/>
-              <a:defRPr/>
-            </a:pPr>
-            <a:endParaRPr lang="en-US" dirty="0" smtClean="0"/>
-          </a:p>
-          <a:p>
-            <a:endParaRPr lang="en-US" dirty="0"/>
           </a:p>
         </p:txBody>
       </p:sp>
@@ -1973,7 +2355,7 @@
           <a:p>
             <a:fld id="{321C9D84-9BB0-4ECD-B693-60559829FA29}" type="slidenum">
               <a:rPr lang="en-US" smtClean="0"/>
-              <a:t>10</a:t>
+              <a:t>11</a:t>
             </a:fld>
             <a:endParaRPr lang="en-US"/>
           </a:p>
@@ -2036,6 +2418,46 @@
           <a:bodyPr/>
           <a:lstStyle/>
           <a:p>
+            <a:r>
+              <a:rPr lang="en-US" dirty="0" smtClean="0"/>
+              <a:t>People with High School Education of level- H1 to H4 can be found in every Profession. But, most of them losing their Lives are in Construction, and Transportation Business.</a:t>
+            </a:r>
+          </a:p>
+          <a:p>
+            <a:endParaRPr lang="en-US" dirty="0" smtClean="0"/>
+          </a:p>
+          <a:p>
+            <a:r>
+              <a:rPr lang="en-US" dirty="0" smtClean="0"/>
+              <a:t>Also, people with higher Education level of C1 to C6 are least involved in Farming Business, maybe because they move to Metro cities. </a:t>
+            </a:r>
+          </a:p>
+          <a:p>
+            <a:r>
+              <a:rPr lang="en-US" dirty="0" smtClean="0"/>
+              <a:t>And most of them (Engineers, Scientists, Lawyers, Judicial Workers, Judges, Teachers, Musicians, Artists, Photographers, Doctors, Pharmacists).</a:t>
+            </a:r>
+          </a:p>
+          <a:p>
+            <a:endParaRPr lang="en-US" dirty="0" smtClean="0"/>
+          </a:p>
+          <a:p>
+            <a:r>
+              <a:rPr lang="en-US" dirty="0" smtClean="0"/>
+              <a:t>Could this be because of Work pressure they have to bear because of an higher level of Job they are pursuing?</a:t>
+            </a:r>
+          </a:p>
+          <a:p>
+            <a:r>
+              <a:rPr lang="en-US" dirty="0" smtClean="0"/>
+              <a:t>Could it be helpful to incorporate a Subject in the Education System, which could help people understand and manage Mental pressures?</a:t>
+            </a:r>
+          </a:p>
+          <a:p>
+            <a:r>
+              <a:rPr lang="en-US" dirty="0" smtClean="0"/>
+              <a:t>Majority of the Subjects had Insurance subscribed from their Employer.</a:t>
+            </a:r>
             <a:endParaRPr lang="en-US" dirty="0"/>
           </a:p>
         </p:txBody>
@@ -2057,7 +2479,7 @@
           <a:p>
             <a:fld id="{321C9D84-9BB0-4ECD-B693-60559829FA29}" type="slidenum">
               <a:rPr lang="en-US" smtClean="0"/>
-              <a:t>11</a:t>
+              <a:t>12</a:t>
             </a:fld>
             <a:endParaRPr lang="en-US"/>
           </a:p>
@@ -4542,7 +4964,7 @@
   <p:cSld>
     <p:bg>
       <p:bgRef idx="1001">
-        <a:schemeClr val="bg1"/>
+        <a:schemeClr val="bg2"/>
       </p:bgRef>
     </p:bg>
     <p:spTree>
@@ -5097,11 +5519,24 @@
             <p:ph type="subTitle" idx="1"/>
           </p:nvPr>
         </p:nvSpPr>
-        <p:spPr/>
-        <p:txBody>
-          <a:bodyPr/>
-          <a:lstStyle/>
-          <a:p>
+        <p:spPr>
+          <a:xfrm>
+            <a:off x="6400800" y="5638800"/>
+            <a:ext cx="2362200" cy="762000"/>
+          </a:xfrm>
+        </p:spPr>
+        <p:txBody>
+          <a:bodyPr/>
+          <a:lstStyle/>
+          <a:p>
+            <a:r>
+              <a:rPr lang="en-US" dirty="0" err="1" smtClean="0"/>
+              <a:t>Ish</a:t>
+            </a:r>
+            <a:r>
+              <a:rPr lang="en-US" dirty="0" smtClean="0"/>
+              <a:t> Gupta</a:t>
+            </a:r>
             <a:endParaRPr lang="en-US" dirty="0"/>
           </a:p>
         </p:txBody>
@@ -5116,10 +5551,143 @@
   <p:clrMapOvr>
     <a:masterClrMapping/>
   </p:clrMapOvr>
+  <p:timing>
+    <p:tnLst>
+      <p:par>
+        <p:cTn id="1" dur="indefinite" restart="never" nodeType="tmRoot"/>
+      </p:par>
+    </p:tnLst>
+  </p:timing>
 </p:sld>
 </file>
 
 <file path=ppt/slides/slide10.xml><?xml version="1.0" encoding="utf-8"?>
+<p:sld xmlns:a="http://schemas.openxmlformats.org/drawingml/2006/main" xmlns:r="http://schemas.openxmlformats.org/officeDocument/2006/relationships" xmlns:p="http://schemas.openxmlformats.org/presentationml/2006/main">
+  <p:cSld>
+    <p:spTree>
+      <p:nvGrpSpPr>
+        <p:cNvPr id="1" name=""/>
+        <p:cNvGrpSpPr/>
+        <p:nvPr/>
+      </p:nvGrpSpPr>
+      <p:grpSpPr>
+        <a:xfrm>
+          <a:off x="0" y="0"/>
+          <a:ext cx="0" cy="0"/>
+          <a:chOff x="0" y="0"/>
+          <a:chExt cx="0" cy="0"/>
+        </a:xfrm>
+      </p:grpSpPr>
+      <p:sp>
+        <p:nvSpPr>
+          <p:cNvPr id="2" name="Title 1"/>
+          <p:cNvSpPr>
+            <a:spLocks noGrp="1"/>
+          </p:cNvSpPr>
+          <p:nvPr>
+            <p:ph type="title"/>
+          </p:nvPr>
+        </p:nvSpPr>
+        <p:spPr/>
+        <p:txBody>
+          <a:bodyPr/>
+          <a:lstStyle/>
+          <a:p>
+            <a:r>
+              <a:rPr lang="en-US" dirty="0" smtClean="0"/>
+              <a:t>Occupation, Location, Race</a:t>
+            </a:r>
+            <a:endParaRPr lang="en-US" dirty="0"/>
+          </a:p>
+        </p:txBody>
+      </p:sp>
+      <p:pic>
+        <p:nvPicPr>
+          <p:cNvPr id="5122" name="Picture 2"/>
+          <p:cNvPicPr>
+            <a:picLocks noGrp="1" noChangeAspect="1" noChangeArrowheads="1"/>
+          </p:cNvPicPr>
+          <p:nvPr>
+            <p:ph idx="1"/>
+          </p:nvPr>
+        </p:nvPicPr>
+        <p:blipFill>
+          <a:blip r:embed="rId2">
+            <a:extLst>
+              <a:ext uri="{28A0092B-C50C-407E-A947-70E740481C1C}">
+                <a14:useLocalDpi xmlns:a14="http://schemas.microsoft.com/office/drawing/2010/main" val="0"/>
+              </a:ext>
+            </a:extLst>
+          </a:blip>
+          <a:srcRect/>
+          <a:stretch>
+            <a:fillRect/>
+          </a:stretch>
+        </p:blipFill>
+        <p:spPr bwMode="auto">
+          <a:xfrm>
+            <a:off x="1238666" y="1806038"/>
+            <a:ext cx="6666667" cy="4114286"/>
+          </a:xfrm>
+          <a:prstGeom prst="rect">
+            <a:avLst/>
+          </a:prstGeom>
+          <a:noFill/>
+          <a:ln>
+            <a:noFill/>
+          </a:ln>
+          <a:effectLst/>
+          <a:extLst>
+            <a:ext uri="{909E8E84-426E-40DD-AFC4-6F175D3DCCD1}">
+              <a14:hiddenFill xmlns:a14="http://schemas.microsoft.com/office/drawing/2010/main">
+                <a:solidFill>
+                  <a:schemeClr val="accent1"/>
+                </a:solidFill>
+              </a14:hiddenFill>
+            </a:ext>
+            <a:ext uri="{91240B29-F687-4F45-9708-019B960494DF}">
+              <a14:hiddenLine xmlns:a14="http://schemas.microsoft.com/office/drawing/2010/main" w="9525">
+                <a:solidFill>
+                  <a:schemeClr val="tx1"/>
+                </a:solidFill>
+                <a:miter lim="800000"/>
+                <a:headEnd/>
+                <a:tailEnd/>
+              </a14:hiddenLine>
+            </a:ext>
+            <a:ext uri="{AF507438-7753-43E0-B8FC-AC1667EBCBE1}">
+              <a14:hiddenEffects xmlns:a14="http://schemas.microsoft.com/office/drawing/2010/main">
+                <a:effectLst>
+                  <a:outerShdw dist="35921" dir="2700000" algn="ctr" rotWithShape="0">
+                    <a:schemeClr val="bg2"/>
+                  </a:outerShdw>
+                </a:effectLst>
+              </a14:hiddenEffects>
+            </a:ext>
+          </a:extLst>
+        </p:spPr>
+      </p:pic>
+    </p:spTree>
+    <p:extLst>
+      <p:ext uri="{BB962C8B-B14F-4D97-AF65-F5344CB8AC3E}">
+        <p14:creationId xmlns:p14="http://schemas.microsoft.com/office/powerpoint/2010/main" val="1451731233"/>
+      </p:ext>
+    </p:extLst>
+  </p:cSld>
+  <p:clrMapOvr>
+    <a:masterClrMapping/>
+  </p:clrMapOvr>
+  <p:timing>
+    <p:tnLst>
+      <p:par>
+        <p:cTn id="1" dur="indefinite" restart="never" nodeType="tmRoot"/>
+      </p:par>
+    </p:tnLst>
+  </p:timing>
+</p:sld>
+</file>
+
+<file path=ppt/slides/slide11.xml><?xml version="1.0" encoding="utf-8"?>
 <p:sld xmlns:a="http://schemas.openxmlformats.org/drawingml/2006/main" xmlns:r="http://schemas.openxmlformats.org/officeDocument/2006/relationships" xmlns:p="http://schemas.openxmlformats.org/presentationml/2006/main">
   <p:cSld>
     <p:spTree>
@@ -5235,10 +5803,17 @@
   <p:clrMapOvr>
     <a:masterClrMapping/>
   </p:clrMapOvr>
+  <p:timing>
+    <p:tnLst>
+      <p:par>
+        <p:cTn id="1" dur="indefinite" restart="never" nodeType="tmRoot"/>
+      </p:par>
+    </p:tnLst>
+  </p:timing>
 </p:sld>
 </file>
 
-<file path=ppt/slides/slide11.xml><?xml version="1.0" encoding="utf-8"?>
+<file path=ppt/slides/slide12.xml><?xml version="1.0" encoding="utf-8"?>
 <p:sld xmlns:a="http://schemas.openxmlformats.org/drawingml/2006/main" xmlns:r="http://schemas.openxmlformats.org/officeDocument/2006/relationships" xmlns:p="http://schemas.openxmlformats.org/presentationml/2006/main">
   <p:cSld>
     <p:spTree>
@@ -5267,32 +5842,85 @@
         </p:nvSpPr>
         <p:spPr/>
         <p:txBody>
-          <a:bodyPr/>
-          <a:lstStyle/>
-          <a:p>
-            <a:endParaRPr lang="en-US"/>
-          </a:p>
-        </p:txBody>
-      </p:sp>
-      <p:sp>
-        <p:nvSpPr>
-          <p:cNvPr id="3" name="Content Placeholder 2"/>
-          <p:cNvSpPr>
-            <a:spLocks noGrp="1"/>
-          </p:cNvSpPr>
+          <a:bodyPr>
+            <a:normAutofit fontScale="90000"/>
+          </a:bodyPr>
+          <a:lstStyle/>
+          <a:p>
+            <a:r>
+              <a:rPr lang="en-US" dirty="0" smtClean="0"/>
+              <a:t>Does Education help people in reducing Suicides?</a:t>
+            </a:r>
+            <a:endParaRPr lang="en-US" dirty="0"/>
+          </a:p>
+        </p:txBody>
+      </p:sp>
+      <p:pic>
+        <p:nvPicPr>
+          <p:cNvPr id="7170" name="Picture 2"/>
+          <p:cNvPicPr>
+            <a:picLocks noGrp="1" noChangeAspect="1" noChangeArrowheads="1"/>
+          </p:cNvPicPr>
           <p:nvPr>
             <p:ph idx="1"/>
           </p:nvPr>
-        </p:nvSpPr>
-        <p:spPr/>
-        <p:txBody>
-          <a:bodyPr/>
-          <a:lstStyle/>
-          <a:p>
-            <a:endParaRPr lang="en-US"/>
-          </a:p>
-        </p:txBody>
-      </p:sp>
+        </p:nvPicPr>
+        <p:blipFill>
+          <a:blip r:embed="rId3">
+            <a:extLst>
+              <a:ext uri="{28A0092B-C50C-407E-A947-70E740481C1C}">
+                <a14:useLocalDpi xmlns:a14="http://schemas.microsoft.com/office/drawing/2010/main" val="0"/>
+              </a:ext>
+            </a:extLst>
+          </a:blip>
+          <a:srcRect/>
+          <a:stretch>
+            <a:fillRect/>
+          </a:stretch>
+        </p:blipFill>
+        <p:spPr bwMode="auto">
+          <a:xfrm>
+            <a:off x="1238666" y="1806038"/>
+            <a:ext cx="6666667" cy="4114286"/>
+          </a:xfrm>
+          <a:prstGeom prst="rect">
+            <a:avLst/>
+          </a:prstGeom>
+          <a:noFill/>
+          <a:ln>
+            <a:noFill/>
+          </a:ln>
+          <a:effectLst/>
+          <a:extLst>
+            <a:ext uri="{909E8E84-426E-40DD-AFC4-6F175D3DCCD1}">
+              <a14:hiddenFill xmlns:a14="http://schemas.microsoft.com/office/drawing/2010/main">
+                <a:solidFill>
+                  <a:schemeClr val="accent1"/>
+                </a:solidFill>
+              </a14:hiddenFill>
+            </a:ext>
+            <a:ext uri="{91240B29-F687-4F45-9708-019B960494DF}">
+              <a14:hiddenLine xmlns:a14="http://schemas.microsoft.com/office/drawing/2010/main" w="9525">
+                <a:solidFill>
+                  <a:schemeClr val="tx1"/>
+                </a:solidFill>
+                <a:miter lim="800000"/>
+                <a:headEnd/>
+                <a:tailEnd/>
+              </a14:hiddenLine>
+            </a:ext>
+            <a:ext uri="{AF507438-7753-43E0-B8FC-AC1667EBCBE1}">
+              <a14:hiddenEffects xmlns:a14="http://schemas.microsoft.com/office/drawing/2010/main">
+                <a:effectLst>
+                  <a:outerShdw dist="35921" dir="2700000" algn="ctr" rotWithShape="0">
+                    <a:schemeClr val="bg2"/>
+                  </a:outerShdw>
+                </a:effectLst>
+              </a14:hiddenEffects>
+            </a:ext>
+          </a:extLst>
+        </p:spPr>
+      </p:pic>
     </p:spTree>
     <p:extLst>
       <p:ext uri="{BB962C8B-B14F-4D97-AF65-F5344CB8AC3E}">
@@ -5303,10 +5931,2383 @@
   <p:clrMapOvr>
     <a:masterClrMapping/>
   </p:clrMapOvr>
+  <p:timing>
+    <p:tnLst>
+      <p:par>
+        <p:cTn id="1" dur="indefinite" restart="never" nodeType="tmRoot"/>
+      </p:par>
+    </p:tnLst>
+  </p:timing>
+</p:sld>
+</file>
+
+<file path=ppt/slides/slide13.xml><?xml version="1.0" encoding="utf-8"?>
+<p:sld xmlns:a="http://schemas.openxmlformats.org/drawingml/2006/main" xmlns:r="http://schemas.openxmlformats.org/officeDocument/2006/relationships" xmlns:p="http://schemas.openxmlformats.org/presentationml/2006/main">
+  <p:cSld>
+    <p:spTree>
+      <p:nvGrpSpPr>
+        <p:cNvPr id="1" name=""/>
+        <p:cNvGrpSpPr/>
+        <p:nvPr/>
+      </p:nvGrpSpPr>
+      <p:grpSpPr>
+        <a:xfrm>
+          <a:off x="0" y="0"/>
+          <a:ext cx="0" cy="0"/>
+          <a:chOff x="0" y="0"/>
+          <a:chExt cx="0" cy="0"/>
+        </a:xfrm>
+      </p:grpSpPr>
+      <p:sp>
+        <p:nvSpPr>
+          <p:cNvPr id="2" name="Title 1"/>
+          <p:cNvSpPr>
+            <a:spLocks noGrp="1"/>
+          </p:cNvSpPr>
+          <p:nvPr>
+            <p:ph type="title"/>
+          </p:nvPr>
+        </p:nvSpPr>
+        <p:spPr>
+          <a:xfrm>
+            <a:off x="609600" y="457200"/>
+            <a:ext cx="8229600" cy="1143000"/>
+          </a:xfrm>
+        </p:spPr>
+        <p:txBody>
+          <a:bodyPr/>
+          <a:lstStyle/>
+          <a:p>
+            <a:r>
+              <a:rPr lang="en-US" dirty="0" smtClean="0"/>
+              <a:t>Survival Analysis of Suicides.</a:t>
+            </a:r>
+            <a:endParaRPr lang="en-US" dirty="0"/>
+          </a:p>
+        </p:txBody>
+      </p:sp>
+      <p:pic>
+        <p:nvPicPr>
+          <p:cNvPr id="5" name="Picture 2"/>
+          <p:cNvPicPr>
+            <a:picLocks noGrp="1" noChangeAspect="1" noChangeArrowheads="1"/>
+          </p:cNvPicPr>
+          <p:nvPr>
+            <p:ph idx="1"/>
+          </p:nvPr>
+        </p:nvPicPr>
+        <p:blipFill>
+          <a:blip r:embed="rId3">
+            <a:extLst>
+              <a:ext uri="{28A0092B-C50C-407E-A947-70E740481C1C}">
+                <a14:useLocalDpi xmlns:a14="http://schemas.microsoft.com/office/drawing/2010/main" val="0"/>
+              </a:ext>
+            </a:extLst>
+          </a:blip>
+          <a:srcRect/>
+          <a:stretch>
+            <a:fillRect/>
+          </a:stretch>
+        </p:blipFill>
+        <p:spPr bwMode="auto">
+          <a:xfrm>
+            <a:off x="1985962" y="1672431"/>
+            <a:ext cx="5172075" cy="4381500"/>
+          </a:xfrm>
+          <a:prstGeom prst="rect">
+            <a:avLst/>
+          </a:prstGeom>
+          <a:noFill/>
+          <a:ln>
+            <a:noFill/>
+          </a:ln>
+          <a:effectLst/>
+          <a:extLst>
+            <a:ext uri="{909E8E84-426E-40DD-AFC4-6F175D3DCCD1}">
+              <a14:hiddenFill xmlns:a14="http://schemas.microsoft.com/office/drawing/2010/main">
+                <a:solidFill>
+                  <a:schemeClr val="accent1"/>
+                </a:solidFill>
+              </a14:hiddenFill>
+            </a:ext>
+            <a:ext uri="{91240B29-F687-4F45-9708-019B960494DF}">
+              <a14:hiddenLine xmlns:a14="http://schemas.microsoft.com/office/drawing/2010/main" w="9525">
+                <a:solidFill>
+                  <a:schemeClr val="tx1"/>
+                </a:solidFill>
+                <a:miter lim="800000"/>
+                <a:headEnd/>
+                <a:tailEnd/>
+              </a14:hiddenLine>
+            </a:ext>
+            <a:ext uri="{AF507438-7753-43E0-B8FC-AC1667EBCBE1}">
+              <a14:hiddenEffects xmlns:a14="http://schemas.microsoft.com/office/drawing/2010/main">
+                <a:effectLst>
+                  <a:outerShdw dist="35921" dir="2700000" algn="ctr" rotWithShape="0">
+                    <a:schemeClr val="bg2"/>
+                  </a:outerShdw>
+                </a:effectLst>
+              </a14:hiddenEffects>
+            </a:ext>
+          </a:extLst>
+        </p:spPr>
+      </p:pic>
+    </p:spTree>
+    <p:extLst>
+      <p:ext uri="{BB962C8B-B14F-4D97-AF65-F5344CB8AC3E}">
+        <p14:creationId xmlns:p14="http://schemas.microsoft.com/office/powerpoint/2010/main" val="2055619067"/>
+      </p:ext>
+    </p:extLst>
+  </p:cSld>
+  <p:clrMapOvr>
+    <a:masterClrMapping/>
+  </p:clrMapOvr>
+  <p:timing>
+    <p:tnLst>
+      <p:par>
+        <p:cTn id="1" dur="indefinite" restart="never" nodeType="tmRoot"/>
+      </p:par>
+    </p:tnLst>
+  </p:timing>
+</p:sld>
+</file>
+
+<file path=ppt/slides/slide14.xml><?xml version="1.0" encoding="utf-8"?>
+<p:sld xmlns:a="http://schemas.openxmlformats.org/drawingml/2006/main" xmlns:r="http://schemas.openxmlformats.org/officeDocument/2006/relationships" xmlns:p="http://schemas.openxmlformats.org/presentationml/2006/main">
+  <p:cSld>
+    <p:spTree>
+      <p:nvGrpSpPr>
+        <p:cNvPr id="1" name=""/>
+        <p:cNvGrpSpPr/>
+        <p:nvPr/>
+      </p:nvGrpSpPr>
+      <p:grpSpPr>
+        <a:xfrm>
+          <a:off x="0" y="0"/>
+          <a:ext cx="0" cy="0"/>
+          <a:chOff x="0" y="0"/>
+          <a:chExt cx="0" cy="0"/>
+        </a:xfrm>
+      </p:grpSpPr>
+      <p:sp>
+        <p:nvSpPr>
+          <p:cNvPr id="2" name="Title 1"/>
+          <p:cNvSpPr>
+            <a:spLocks noGrp="1"/>
+          </p:cNvSpPr>
+          <p:nvPr>
+            <p:ph type="title"/>
+          </p:nvPr>
+        </p:nvSpPr>
+        <p:spPr>
+          <a:xfrm>
+            <a:off x="457200" y="274638"/>
+            <a:ext cx="8153400" cy="792162"/>
+          </a:xfrm>
+        </p:spPr>
+        <p:txBody>
+          <a:bodyPr/>
+          <a:lstStyle/>
+          <a:p>
+            <a:r>
+              <a:rPr lang="en-US" dirty="0" smtClean="0"/>
+              <a:t>How does Age actually impact?</a:t>
+            </a:r>
+            <a:endParaRPr lang="en-US" dirty="0"/>
+          </a:p>
+        </p:txBody>
+      </p:sp>
+      <p:pic>
+        <p:nvPicPr>
+          <p:cNvPr id="9220" name="Picture 4"/>
+          <p:cNvPicPr>
+            <a:picLocks noChangeAspect="1" noChangeArrowheads="1"/>
+          </p:cNvPicPr>
+          <p:nvPr/>
+        </p:nvPicPr>
+        <p:blipFill>
+          <a:blip r:embed="rId3">
+            <a:extLst>
+              <a:ext uri="{28A0092B-C50C-407E-A947-70E740481C1C}">
+                <a14:useLocalDpi xmlns:a14="http://schemas.microsoft.com/office/drawing/2010/main" val="0"/>
+              </a:ext>
+            </a:extLst>
+          </a:blip>
+          <a:srcRect/>
+          <a:stretch>
+            <a:fillRect/>
+          </a:stretch>
+        </p:blipFill>
+        <p:spPr bwMode="auto">
+          <a:xfrm>
+            <a:off x="304800" y="1066800"/>
+            <a:ext cx="4567386" cy="2819400"/>
+          </a:xfrm>
+          <a:prstGeom prst="rect">
+            <a:avLst/>
+          </a:prstGeom>
+          <a:noFill/>
+          <a:ln>
+            <a:noFill/>
+          </a:ln>
+          <a:effectLst/>
+          <a:extLst>
+            <a:ext uri="{909E8E84-426E-40DD-AFC4-6F175D3DCCD1}">
+              <a14:hiddenFill xmlns:a14="http://schemas.microsoft.com/office/drawing/2010/main">
+                <a:solidFill>
+                  <a:schemeClr val="accent1"/>
+                </a:solidFill>
+              </a14:hiddenFill>
+            </a:ext>
+            <a:ext uri="{91240B29-F687-4F45-9708-019B960494DF}">
+              <a14:hiddenLine xmlns:a14="http://schemas.microsoft.com/office/drawing/2010/main" w="9525">
+                <a:solidFill>
+                  <a:schemeClr val="tx1"/>
+                </a:solidFill>
+                <a:miter lim="800000"/>
+                <a:headEnd/>
+                <a:tailEnd/>
+              </a14:hiddenLine>
+            </a:ext>
+            <a:ext uri="{AF507438-7753-43E0-B8FC-AC1667EBCBE1}">
+              <a14:hiddenEffects xmlns:a14="http://schemas.microsoft.com/office/drawing/2010/main">
+                <a:effectLst>
+                  <a:outerShdw dist="35921" dir="2700000" algn="ctr" rotWithShape="0">
+                    <a:schemeClr val="bg2"/>
+                  </a:outerShdw>
+                </a:effectLst>
+              </a14:hiddenEffects>
+            </a:ext>
+          </a:extLst>
+        </p:spPr>
+      </p:pic>
+      <p:pic>
+        <p:nvPicPr>
+          <p:cNvPr id="9221" name="Picture 5"/>
+          <p:cNvPicPr>
+            <a:picLocks noChangeAspect="1" noChangeArrowheads="1"/>
+          </p:cNvPicPr>
+          <p:nvPr/>
+        </p:nvPicPr>
+        <p:blipFill>
+          <a:blip r:embed="rId4">
+            <a:extLst>
+              <a:ext uri="{28A0092B-C50C-407E-A947-70E740481C1C}">
+                <a14:useLocalDpi xmlns:a14="http://schemas.microsoft.com/office/drawing/2010/main" val="0"/>
+              </a:ext>
+            </a:extLst>
+          </a:blip>
+          <a:srcRect/>
+          <a:stretch>
+            <a:fillRect/>
+          </a:stretch>
+        </p:blipFill>
+        <p:spPr bwMode="auto">
+          <a:xfrm>
+            <a:off x="421025" y="3886200"/>
+            <a:ext cx="4567385" cy="2819400"/>
+          </a:xfrm>
+          <a:prstGeom prst="rect">
+            <a:avLst/>
+          </a:prstGeom>
+          <a:noFill/>
+          <a:ln>
+            <a:noFill/>
+          </a:ln>
+          <a:effectLst/>
+          <a:extLst>
+            <a:ext uri="{909E8E84-426E-40DD-AFC4-6F175D3DCCD1}">
+              <a14:hiddenFill xmlns:a14="http://schemas.microsoft.com/office/drawing/2010/main">
+                <a:solidFill>
+                  <a:schemeClr val="accent1"/>
+                </a:solidFill>
+              </a14:hiddenFill>
+            </a:ext>
+            <a:ext uri="{91240B29-F687-4F45-9708-019B960494DF}">
+              <a14:hiddenLine xmlns:a14="http://schemas.microsoft.com/office/drawing/2010/main" w="9525">
+                <a:solidFill>
+                  <a:schemeClr val="tx1"/>
+                </a:solidFill>
+                <a:miter lim="800000"/>
+                <a:headEnd/>
+                <a:tailEnd/>
+              </a14:hiddenLine>
+            </a:ext>
+            <a:ext uri="{AF507438-7753-43E0-B8FC-AC1667EBCBE1}">
+              <a14:hiddenEffects xmlns:a14="http://schemas.microsoft.com/office/drawing/2010/main">
+                <a:effectLst>
+                  <a:outerShdw dist="35921" dir="2700000" algn="ctr" rotWithShape="0">
+                    <a:schemeClr val="bg2"/>
+                  </a:outerShdw>
+                </a:effectLst>
+              </a14:hiddenEffects>
+            </a:ext>
+          </a:extLst>
+        </p:spPr>
+      </p:pic>
+    </p:spTree>
+    <p:extLst>
+      <p:ext uri="{BB962C8B-B14F-4D97-AF65-F5344CB8AC3E}">
+        <p14:creationId xmlns:p14="http://schemas.microsoft.com/office/powerpoint/2010/main" val="4094045591"/>
+      </p:ext>
+    </p:extLst>
+  </p:cSld>
+  <p:clrMapOvr>
+    <a:masterClrMapping/>
+  </p:clrMapOvr>
+  <p:timing>
+    <p:tnLst>
+      <p:par>
+        <p:cTn id="1" dur="indefinite" restart="never" nodeType="tmRoot"/>
+      </p:par>
+    </p:tnLst>
+  </p:timing>
+</p:sld>
+</file>
+
+<file path=ppt/slides/slide15.xml><?xml version="1.0" encoding="utf-8"?>
+<p:sld xmlns:a="http://schemas.openxmlformats.org/drawingml/2006/main" xmlns:r="http://schemas.openxmlformats.org/officeDocument/2006/relationships" xmlns:p="http://schemas.openxmlformats.org/presentationml/2006/main">
+  <p:cSld>
+    <p:spTree>
+      <p:nvGrpSpPr>
+        <p:cNvPr id="1" name=""/>
+        <p:cNvGrpSpPr/>
+        <p:nvPr/>
+      </p:nvGrpSpPr>
+      <p:grpSpPr>
+        <a:xfrm>
+          <a:off x="0" y="0"/>
+          <a:ext cx="0" cy="0"/>
+          <a:chOff x="0" y="0"/>
+          <a:chExt cx="0" cy="0"/>
+        </a:xfrm>
+      </p:grpSpPr>
+      <p:sp>
+        <p:nvSpPr>
+          <p:cNvPr id="2" name="Title 1"/>
+          <p:cNvSpPr>
+            <a:spLocks noGrp="1"/>
+          </p:cNvSpPr>
+          <p:nvPr>
+            <p:ph type="title"/>
+          </p:nvPr>
+        </p:nvSpPr>
+        <p:spPr/>
+        <p:txBody>
+          <a:bodyPr/>
+          <a:lstStyle/>
+          <a:p>
+            <a:r>
+              <a:rPr lang="en-US" dirty="0" smtClean="0"/>
+              <a:t>Race impacts</a:t>
+            </a:r>
+            <a:endParaRPr lang="en-US" dirty="0"/>
+          </a:p>
+        </p:txBody>
+      </p:sp>
+      <p:pic>
+        <p:nvPicPr>
+          <p:cNvPr id="11266" name="Picture 2"/>
+          <p:cNvPicPr>
+            <a:picLocks noGrp="1" noChangeAspect="1" noChangeArrowheads="1"/>
+          </p:cNvPicPr>
+          <p:nvPr>
+            <p:ph idx="1"/>
+          </p:nvPr>
+        </p:nvPicPr>
+        <p:blipFill>
+          <a:blip r:embed="rId3">
+            <a:extLst>
+              <a:ext uri="{28A0092B-C50C-407E-A947-70E740481C1C}">
+                <a14:useLocalDpi xmlns:a14="http://schemas.microsoft.com/office/drawing/2010/main" val="0"/>
+              </a:ext>
+            </a:extLst>
+          </a:blip>
+          <a:srcRect/>
+          <a:stretch>
+            <a:fillRect/>
+          </a:stretch>
+        </p:blipFill>
+        <p:spPr bwMode="auto">
+          <a:xfrm>
+            <a:off x="304800" y="1283643"/>
+            <a:ext cx="3389684" cy="2091919"/>
+          </a:xfrm>
+          <a:prstGeom prst="rect">
+            <a:avLst/>
+          </a:prstGeom>
+          <a:noFill/>
+          <a:ln>
+            <a:noFill/>
+          </a:ln>
+          <a:effectLst/>
+          <a:extLst>
+            <a:ext uri="{909E8E84-426E-40DD-AFC4-6F175D3DCCD1}">
+              <a14:hiddenFill xmlns:a14="http://schemas.microsoft.com/office/drawing/2010/main">
+                <a:solidFill>
+                  <a:schemeClr val="accent1"/>
+                </a:solidFill>
+              </a14:hiddenFill>
+            </a:ext>
+            <a:ext uri="{91240B29-F687-4F45-9708-019B960494DF}">
+              <a14:hiddenLine xmlns:a14="http://schemas.microsoft.com/office/drawing/2010/main" w="9525">
+                <a:solidFill>
+                  <a:schemeClr val="tx1"/>
+                </a:solidFill>
+                <a:miter lim="800000"/>
+                <a:headEnd/>
+                <a:tailEnd/>
+              </a14:hiddenLine>
+            </a:ext>
+            <a:ext uri="{AF507438-7753-43E0-B8FC-AC1667EBCBE1}">
+              <a14:hiddenEffects xmlns:a14="http://schemas.microsoft.com/office/drawing/2010/main">
+                <a:effectLst>
+                  <a:outerShdw dist="35921" dir="2700000" algn="ctr" rotWithShape="0">
+                    <a:schemeClr val="bg2"/>
+                  </a:outerShdw>
+                </a:effectLst>
+              </a14:hiddenEffects>
+            </a:ext>
+          </a:extLst>
+        </p:spPr>
+      </p:pic>
+      <p:pic>
+        <p:nvPicPr>
+          <p:cNvPr id="5" name="Picture 2"/>
+          <p:cNvPicPr>
+            <a:picLocks noChangeAspect="1" noChangeArrowheads="1"/>
+          </p:cNvPicPr>
+          <p:nvPr/>
+        </p:nvPicPr>
+        <p:blipFill>
+          <a:blip r:embed="rId4">
+            <a:extLst>
+              <a:ext uri="{28A0092B-C50C-407E-A947-70E740481C1C}">
+                <a14:useLocalDpi xmlns:a14="http://schemas.microsoft.com/office/drawing/2010/main" val="0"/>
+              </a:ext>
+            </a:extLst>
+          </a:blip>
+          <a:srcRect/>
+          <a:stretch>
+            <a:fillRect/>
+          </a:stretch>
+        </p:blipFill>
+        <p:spPr bwMode="auto">
+          <a:xfrm>
+            <a:off x="4724400" y="1283643"/>
+            <a:ext cx="3352800" cy="2069157"/>
+          </a:xfrm>
+          <a:prstGeom prst="rect">
+            <a:avLst/>
+          </a:prstGeom>
+          <a:noFill/>
+          <a:ln>
+            <a:noFill/>
+          </a:ln>
+          <a:effectLst/>
+          <a:extLst>
+            <a:ext uri="{909E8E84-426E-40DD-AFC4-6F175D3DCCD1}">
+              <a14:hiddenFill xmlns:a14="http://schemas.microsoft.com/office/drawing/2010/main">
+                <a:solidFill>
+                  <a:schemeClr val="accent1"/>
+                </a:solidFill>
+              </a14:hiddenFill>
+            </a:ext>
+            <a:ext uri="{91240B29-F687-4F45-9708-019B960494DF}">
+              <a14:hiddenLine xmlns:a14="http://schemas.microsoft.com/office/drawing/2010/main" w="9525">
+                <a:solidFill>
+                  <a:schemeClr val="tx1"/>
+                </a:solidFill>
+                <a:miter lim="800000"/>
+                <a:headEnd/>
+                <a:tailEnd/>
+              </a14:hiddenLine>
+            </a:ext>
+            <a:ext uri="{AF507438-7753-43E0-B8FC-AC1667EBCBE1}">
+              <a14:hiddenEffects xmlns:a14="http://schemas.microsoft.com/office/drawing/2010/main">
+                <a:effectLst>
+                  <a:outerShdw dist="35921" dir="2700000" algn="ctr" rotWithShape="0">
+                    <a:schemeClr val="bg2"/>
+                  </a:outerShdw>
+                </a:effectLst>
+              </a14:hiddenEffects>
+            </a:ext>
+          </a:extLst>
+        </p:spPr>
+      </p:pic>
+      <p:pic>
+        <p:nvPicPr>
+          <p:cNvPr id="11267" name="Picture 3"/>
+          <p:cNvPicPr>
+            <a:picLocks noChangeAspect="1" noChangeArrowheads="1"/>
+          </p:cNvPicPr>
+          <p:nvPr/>
+        </p:nvPicPr>
+        <p:blipFill>
+          <a:blip r:embed="rId5">
+            <a:extLst>
+              <a:ext uri="{28A0092B-C50C-407E-A947-70E740481C1C}">
+                <a14:useLocalDpi xmlns:a14="http://schemas.microsoft.com/office/drawing/2010/main" val="0"/>
+              </a:ext>
+            </a:extLst>
+          </a:blip>
+          <a:srcRect/>
+          <a:stretch>
+            <a:fillRect/>
+          </a:stretch>
+        </p:blipFill>
+        <p:spPr bwMode="auto">
+          <a:xfrm>
+            <a:off x="1447800" y="3414318"/>
+            <a:ext cx="5334000" cy="3292624"/>
+          </a:xfrm>
+          <a:prstGeom prst="rect">
+            <a:avLst/>
+          </a:prstGeom>
+          <a:noFill/>
+          <a:ln>
+            <a:noFill/>
+          </a:ln>
+          <a:effectLst/>
+          <a:extLst>
+            <a:ext uri="{909E8E84-426E-40DD-AFC4-6F175D3DCCD1}">
+              <a14:hiddenFill xmlns:a14="http://schemas.microsoft.com/office/drawing/2010/main">
+                <a:solidFill>
+                  <a:schemeClr val="accent1"/>
+                </a:solidFill>
+              </a14:hiddenFill>
+            </a:ext>
+            <a:ext uri="{91240B29-F687-4F45-9708-019B960494DF}">
+              <a14:hiddenLine xmlns:a14="http://schemas.microsoft.com/office/drawing/2010/main" w="9525">
+                <a:solidFill>
+                  <a:schemeClr val="tx1"/>
+                </a:solidFill>
+                <a:miter lim="800000"/>
+                <a:headEnd/>
+                <a:tailEnd/>
+              </a14:hiddenLine>
+            </a:ext>
+            <a:ext uri="{AF507438-7753-43E0-B8FC-AC1667EBCBE1}">
+              <a14:hiddenEffects xmlns:a14="http://schemas.microsoft.com/office/drawing/2010/main">
+                <a:effectLst>
+                  <a:outerShdw dist="35921" dir="2700000" algn="ctr" rotWithShape="0">
+                    <a:schemeClr val="bg2"/>
+                  </a:outerShdw>
+                </a:effectLst>
+              </a14:hiddenEffects>
+            </a:ext>
+          </a:extLst>
+        </p:spPr>
+      </p:pic>
+    </p:spTree>
+    <p:extLst>
+      <p:ext uri="{BB962C8B-B14F-4D97-AF65-F5344CB8AC3E}">
+        <p14:creationId xmlns:p14="http://schemas.microsoft.com/office/powerpoint/2010/main" val="2811555268"/>
+      </p:ext>
+    </p:extLst>
+  </p:cSld>
+  <p:clrMapOvr>
+    <a:masterClrMapping/>
+  </p:clrMapOvr>
+  <p:timing>
+    <p:tnLst>
+      <p:par>
+        <p:cTn id="1" dur="indefinite" restart="never" nodeType="tmRoot"/>
+      </p:par>
+    </p:tnLst>
+  </p:timing>
+</p:sld>
+</file>
+
+<file path=ppt/slides/slide16.xml><?xml version="1.0" encoding="utf-8"?>
+<p:sld xmlns:a="http://schemas.openxmlformats.org/drawingml/2006/main" xmlns:r="http://schemas.openxmlformats.org/officeDocument/2006/relationships" xmlns:p="http://schemas.openxmlformats.org/presentationml/2006/main">
+  <p:cSld>
+    <p:spTree>
+      <p:nvGrpSpPr>
+        <p:cNvPr id="1" name=""/>
+        <p:cNvGrpSpPr/>
+        <p:nvPr/>
+      </p:nvGrpSpPr>
+      <p:grpSpPr>
+        <a:xfrm>
+          <a:off x="0" y="0"/>
+          <a:ext cx="0" cy="0"/>
+          <a:chOff x="0" y="0"/>
+          <a:chExt cx="0" cy="0"/>
+        </a:xfrm>
+      </p:grpSpPr>
+      <p:sp>
+        <p:nvSpPr>
+          <p:cNvPr id="2" name="Title 1"/>
+          <p:cNvSpPr>
+            <a:spLocks noGrp="1"/>
+          </p:cNvSpPr>
+          <p:nvPr>
+            <p:ph type="title"/>
+          </p:nvPr>
+        </p:nvSpPr>
+        <p:spPr/>
+        <p:txBody>
+          <a:bodyPr/>
+          <a:lstStyle/>
+          <a:p>
+            <a:r>
+              <a:rPr lang="en-US" dirty="0" smtClean="0"/>
+              <a:t>Inclination to loss w.r.t Gender</a:t>
+            </a:r>
+            <a:endParaRPr lang="en-US" dirty="0"/>
+          </a:p>
+        </p:txBody>
+      </p:sp>
+      <p:pic>
+        <p:nvPicPr>
+          <p:cNvPr id="12290" name="Picture 2"/>
+          <p:cNvPicPr>
+            <a:picLocks noGrp="1" noChangeAspect="1" noChangeArrowheads="1"/>
+          </p:cNvPicPr>
+          <p:nvPr>
+            <p:ph idx="1"/>
+          </p:nvPr>
+        </p:nvPicPr>
+        <p:blipFill>
+          <a:blip r:embed="rId3">
+            <a:extLst>
+              <a:ext uri="{28A0092B-C50C-407E-A947-70E740481C1C}">
+                <a14:useLocalDpi xmlns:a14="http://schemas.microsoft.com/office/drawing/2010/main" val="0"/>
+              </a:ext>
+            </a:extLst>
+          </a:blip>
+          <a:srcRect/>
+          <a:stretch>
+            <a:fillRect/>
+          </a:stretch>
+        </p:blipFill>
+        <p:spPr bwMode="auto">
+          <a:xfrm>
+            <a:off x="2229266" y="1096230"/>
+            <a:ext cx="3409534" cy="2104170"/>
+          </a:xfrm>
+          <a:prstGeom prst="rect">
+            <a:avLst/>
+          </a:prstGeom>
+          <a:noFill/>
+          <a:ln>
+            <a:noFill/>
+          </a:ln>
+          <a:effectLst/>
+          <a:extLst>
+            <a:ext uri="{909E8E84-426E-40DD-AFC4-6F175D3DCCD1}">
+              <a14:hiddenFill xmlns:a14="http://schemas.microsoft.com/office/drawing/2010/main">
+                <a:solidFill>
+                  <a:schemeClr val="accent1"/>
+                </a:solidFill>
+              </a14:hiddenFill>
+            </a:ext>
+            <a:ext uri="{91240B29-F687-4F45-9708-019B960494DF}">
+              <a14:hiddenLine xmlns:a14="http://schemas.microsoft.com/office/drawing/2010/main" w="9525">
+                <a:solidFill>
+                  <a:schemeClr val="tx1"/>
+                </a:solidFill>
+                <a:miter lim="800000"/>
+                <a:headEnd/>
+                <a:tailEnd/>
+              </a14:hiddenLine>
+            </a:ext>
+            <a:ext uri="{AF507438-7753-43E0-B8FC-AC1667EBCBE1}">
+              <a14:hiddenEffects xmlns:a14="http://schemas.microsoft.com/office/drawing/2010/main">
+                <a:effectLst>
+                  <a:outerShdw dist="35921" dir="2700000" algn="ctr" rotWithShape="0">
+                    <a:schemeClr val="bg2"/>
+                  </a:outerShdw>
+                </a:effectLst>
+              </a14:hiddenEffects>
+            </a:ext>
+          </a:extLst>
+        </p:spPr>
+      </p:pic>
+      <p:pic>
+        <p:nvPicPr>
+          <p:cNvPr id="12291" name="Picture 3"/>
+          <p:cNvPicPr>
+            <a:picLocks noChangeAspect="1" noChangeArrowheads="1"/>
+          </p:cNvPicPr>
+          <p:nvPr/>
+        </p:nvPicPr>
+        <p:blipFill>
+          <a:blip r:embed="rId4">
+            <a:extLst>
+              <a:ext uri="{28A0092B-C50C-407E-A947-70E740481C1C}">
+                <a14:useLocalDpi xmlns:a14="http://schemas.microsoft.com/office/drawing/2010/main" val="0"/>
+              </a:ext>
+            </a:extLst>
+          </a:blip>
+          <a:srcRect/>
+          <a:stretch>
+            <a:fillRect/>
+          </a:stretch>
+        </p:blipFill>
+        <p:spPr bwMode="auto">
+          <a:xfrm>
+            <a:off x="1716087" y="3278487"/>
+            <a:ext cx="5675313" cy="3503313"/>
+          </a:xfrm>
+          <a:prstGeom prst="rect">
+            <a:avLst/>
+          </a:prstGeom>
+          <a:noFill/>
+          <a:ln>
+            <a:noFill/>
+          </a:ln>
+          <a:effectLst/>
+          <a:extLst>
+            <a:ext uri="{909E8E84-426E-40DD-AFC4-6F175D3DCCD1}">
+              <a14:hiddenFill xmlns:a14="http://schemas.microsoft.com/office/drawing/2010/main">
+                <a:solidFill>
+                  <a:schemeClr val="accent1"/>
+                </a:solidFill>
+              </a14:hiddenFill>
+            </a:ext>
+            <a:ext uri="{91240B29-F687-4F45-9708-019B960494DF}">
+              <a14:hiddenLine xmlns:a14="http://schemas.microsoft.com/office/drawing/2010/main" w="9525">
+                <a:solidFill>
+                  <a:schemeClr val="tx1"/>
+                </a:solidFill>
+                <a:miter lim="800000"/>
+                <a:headEnd/>
+                <a:tailEnd/>
+              </a14:hiddenLine>
+            </a:ext>
+            <a:ext uri="{AF507438-7753-43E0-B8FC-AC1667EBCBE1}">
+              <a14:hiddenEffects xmlns:a14="http://schemas.microsoft.com/office/drawing/2010/main">
+                <a:effectLst>
+                  <a:outerShdw dist="35921" dir="2700000" algn="ctr" rotWithShape="0">
+                    <a:schemeClr val="bg2"/>
+                  </a:outerShdw>
+                </a:effectLst>
+              </a14:hiddenEffects>
+            </a:ext>
+          </a:extLst>
+        </p:spPr>
+      </p:pic>
+    </p:spTree>
+    <p:extLst>
+      <p:ext uri="{BB962C8B-B14F-4D97-AF65-F5344CB8AC3E}">
+        <p14:creationId xmlns:p14="http://schemas.microsoft.com/office/powerpoint/2010/main" val="1012128438"/>
+      </p:ext>
+    </p:extLst>
+  </p:cSld>
+  <p:clrMapOvr>
+    <a:masterClrMapping/>
+  </p:clrMapOvr>
+  <p:timing>
+    <p:tnLst>
+      <p:par>
+        <p:cTn id="1" dur="indefinite" restart="never" nodeType="tmRoot"/>
+      </p:par>
+    </p:tnLst>
+  </p:timing>
+</p:sld>
+</file>
+
+<file path=ppt/slides/slide17.xml><?xml version="1.0" encoding="utf-8"?>
+<p:sld xmlns:a="http://schemas.openxmlformats.org/drawingml/2006/main" xmlns:r="http://schemas.openxmlformats.org/officeDocument/2006/relationships" xmlns:p="http://schemas.openxmlformats.org/presentationml/2006/main">
+  <p:cSld>
+    <p:spTree>
+      <p:nvGrpSpPr>
+        <p:cNvPr id="1" name=""/>
+        <p:cNvGrpSpPr/>
+        <p:nvPr/>
+      </p:nvGrpSpPr>
+      <p:grpSpPr>
+        <a:xfrm>
+          <a:off x="0" y="0"/>
+          <a:ext cx="0" cy="0"/>
+          <a:chOff x="0" y="0"/>
+          <a:chExt cx="0" cy="0"/>
+        </a:xfrm>
+      </p:grpSpPr>
+      <p:sp>
+        <p:nvSpPr>
+          <p:cNvPr id="2" name="Title 1"/>
+          <p:cNvSpPr>
+            <a:spLocks noGrp="1"/>
+          </p:cNvSpPr>
+          <p:nvPr>
+            <p:ph type="title"/>
+          </p:nvPr>
+        </p:nvSpPr>
+        <p:spPr/>
+        <p:txBody>
+          <a:bodyPr>
+            <a:normAutofit/>
+          </a:bodyPr>
+          <a:lstStyle/>
+          <a:p>
+            <a:r>
+              <a:rPr lang="en-US" dirty="0" smtClean="0"/>
+              <a:t>How does getting married impact?</a:t>
+            </a:r>
+            <a:endParaRPr lang="en-US" dirty="0"/>
+          </a:p>
+        </p:txBody>
+      </p:sp>
+      <p:pic>
+        <p:nvPicPr>
+          <p:cNvPr id="14338" name="Picture 2" descr="C:\Users\SAI\Downloads\game-over3.jpg"/>
+          <p:cNvPicPr>
+            <a:picLocks noGrp="1" noChangeAspect="1" noChangeArrowheads="1"/>
+          </p:cNvPicPr>
+          <p:nvPr>
+            <p:ph idx="1"/>
+          </p:nvPr>
+        </p:nvPicPr>
+        <p:blipFill>
+          <a:blip r:embed="rId3">
+            <a:extLst>
+              <a:ext uri="{28A0092B-C50C-407E-A947-70E740481C1C}">
+                <a14:useLocalDpi xmlns:a14="http://schemas.microsoft.com/office/drawing/2010/main" val="0"/>
+              </a:ext>
+            </a:extLst>
+          </a:blip>
+          <a:srcRect/>
+          <a:stretch>
+            <a:fillRect/>
+          </a:stretch>
+        </p:blipFill>
+        <p:spPr bwMode="auto">
+          <a:xfrm>
+            <a:off x="1645920" y="2217261"/>
+            <a:ext cx="5852160" cy="3291840"/>
+          </a:xfrm>
+          <a:prstGeom prst="rect">
+            <a:avLst/>
+          </a:prstGeom>
+          <a:noFill/>
+          <a:extLst>
+            <a:ext uri="{909E8E84-426E-40DD-AFC4-6F175D3DCCD1}">
+              <a14:hiddenFill xmlns:a14="http://schemas.microsoft.com/office/drawing/2010/main">
+                <a:solidFill>
+                  <a:srgbClr val="FFFFFF"/>
+                </a:solidFill>
+              </a14:hiddenFill>
+            </a:ext>
+          </a:extLst>
+        </p:spPr>
+      </p:pic>
+    </p:spTree>
+    <p:extLst>
+      <p:ext uri="{BB962C8B-B14F-4D97-AF65-F5344CB8AC3E}">
+        <p14:creationId xmlns:p14="http://schemas.microsoft.com/office/powerpoint/2010/main" val="3131035892"/>
+      </p:ext>
+    </p:extLst>
+  </p:cSld>
+  <p:clrMapOvr>
+    <a:masterClrMapping/>
+  </p:clrMapOvr>
+  <p:timing>
+    <p:tnLst>
+      <p:par>
+        <p:cTn id="1" dur="indefinite" restart="never" nodeType="tmRoot"/>
+      </p:par>
+    </p:tnLst>
+  </p:timing>
+</p:sld>
+</file>
+
+<file path=ppt/slides/slide18.xml><?xml version="1.0" encoding="utf-8"?>
+<p:sld xmlns:a="http://schemas.openxmlformats.org/drawingml/2006/main" xmlns:r="http://schemas.openxmlformats.org/officeDocument/2006/relationships" xmlns:p="http://schemas.openxmlformats.org/presentationml/2006/main">
+  <p:cSld>
+    <p:spTree>
+      <p:nvGrpSpPr>
+        <p:cNvPr id="1" name=""/>
+        <p:cNvGrpSpPr/>
+        <p:nvPr/>
+      </p:nvGrpSpPr>
+      <p:grpSpPr>
+        <a:xfrm>
+          <a:off x="0" y="0"/>
+          <a:ext cx="0" cy="0"/>
+          <a:chOff x="0" y="0"/>
+          <a:chExt cx="0" cy="0"/>
+        </a:xfrm>
+      </p:grpSpPr>
+      <p:pic>
+        <p:nvPicPr>
+          <p:cNvPr id="13314" name="Picture 2"/>
+          <p:cNvPicPr>
+            <a:picLocks noGrp="1" noChangeAspect="1" noChangeArrowheads="1"/>
+          </p:cNvPicPr>
+          <p:nvPr>
+            <p:ph idx="1"/>
+          </p:nvPr>
+        </p:nvPicPr>
+        <p:blipFill>
+          <a:blip r:embed="rId3">
+            <a:extLst>
+              <a:ext uri="{28A0092B-C50C-407E-A947-70E740481C1C}">
+                <a14:useLocalDpi xmlns:a14="http://schemas.microsoft.com/office/drawing/2010/main" val="0"/>
+              </a:ext>
+            </a:extLst>
+          </a:blip>
+          <a:srcRect/>
+          <a:stretch>
+            <a:fillRect/>
+          </a:stretch>
+        </p:blipFill>
+        <p:spPr bwMode="auto">
+          <a:xfrm>
+            <a:off x="1524000" y="228600"/>
+            <a:ext cx="4191000" cy="2586446"/>
+          </a:xfrm>
+          <a:prstGeom prst="rect">
+            <a:avLst/>
+          </a:prstGeom>
+          <a:noFill/>
+          <a:ln>
+            <a:noFill/>
+          </a:ln>
+          <a:effectLst/>
+          <a:extLst>
+            <a:ext uri="{909E8E84-426E-40DD-AFC4-6F175D3DCCD1}">
+              <a14:hiddenFill xmlns:a14="http://schemas.microsoft.com/office/drawing/2010/main">
+                <a:solidFill>
+                  <a:schemeClr val="accent1"/>
+                </a:solidFill>
+              </a14:hiddenFill>
+            </a:ext>
+            <a:ext uri="{91240B29-F687-4F45-9708-019B960494DF}">
+              <a14:hiddenLine xmlns:a14="http://schemas.microsoft.com/office/drawing/2010/main" w="9525">
+                <a:solidFill>
+                  <a:schemeClr val="tx1"/>
+                </a:solidFill>
+                <a:miter lim="800000"/>
+                <a:headEnd/>
+                <a:tailEnd/>
+              </a14:hiddenLine>
+            </a:ext>
+            <a:ext uri="{AF507438-7753-43E0-B8FC-AC1667EBCBE1}">
+              <a14:hiddenEffects xmlns:a14="http://schemas.microsoft.com/office/drawing/2010/main">
+                <a:effectLst>
+                  <a:outerShdw dist="35921" dir="2700000" algn="ctr" rotWithShape="0">
+                    <a:schemeClr val="bg2"/>
+                  </a:outerShdw>
+                </a:effectLst>
+              </a14:hiddenEffects>
+            </a:ext>
+          </a:extLst>
+        </p:spPr>
+      </p:pic>
+      <p:pic>
+        <p:nvPicPr>
+          <p:cNvPr id="13315" name="Picture 3"/>
+          <p:cNvPicPr>
+            <a:picLocks noChangeAspect="1" noChangeArrowheads="1"/>
+          </p:cNvPicPr>
+          <p:nvPr/>
+        </p:nvPicPr>
+        <p:blipFill>
+          <a:blip r:embed="rId4">
+            <a:extLst>
+              <a:ext uri="{28A0092B-C50C-407E-A947-70E740481C1C}">
+                <a14:useLocalDpi xmlns:a14="http://schemas.microsoft.com/office/drawing/2010/main" val="0"/>
+              </a:ext>
+            </a:extLst>
+          </a:blip>
+          <a:srcRect/>
+          <a:stretch>
+            <a:fillRect/>
+          </a:stretch>
+        </p:blipFill>
+        <p:spPr bwMode="auto">
+          <a:xfrm>
+            <a:off x="762001" y="2919590"/>
+            <a:ext cx="6172200" cy="3810036"/>
+          </a:xfrm>
+          <a:prstGeom prst="rect">
+            <a:avLst/>
+          </a:prstGeom>
+          <a:noFill/>
+          <a:ln>
+            <a:noFill/>
+          </a:ln>
+          <a:effectLst/>
+          <a:extLst>
+            <a:ext uri="{909E8E84-426E-40DD-AFC4-6F175D3DCCD1}">
+              <a14:hiddenFill xmlns:a14="http://schemas.microsoft.com/office/drawing/2010/main">
+                <a:solidFill>
+                  <a:schemeClr val="accent1"/>
+                </a:solidFill>
+              </a14:hiddenFill>
+            </a:ext>
+            <a:ext uri="{91240B29-F687-4F45-9708-019B960494DF}">
+              <a14:hiddenLine xmlns:a14="http://schemas.microsoft.com/office/drawing/2010/main" w="9525">
+                <a:solidFill>
+                  <a:schemeClr val="tx1"/>
+                </a:solidFill>
+                <a:miter lim="800000"/>
+                <a:headEnd/>
+                <a:tailEnd/>
+              </a14:hiddenLine>
+            </a:ext>
+            <a:ext uri="{AF507438-7753-43E0-B8FC-AC1667EBCBE1}">
+              <a14:hiddenEffects xmlns:a14="http://schemas.microsoft.com/office/drawing/2010/main">
+                <a:effectLst>
+                  <a:outerShdw dist="35921" dir="2700000" algn="ctr" rotWithShape="0">
+                    <a:schemeClr val="bg2"/>
+                  </a:outerShdw>
+                </a:effectLst>
+              </a14:hiddenEffects>
+            </a:ext>
+          </a:extLst>
+        </p:spPr>
+      </p:pic>
+    </p:spTree>
+    <p:extLst>
+      <p:ext uri="{BB962C8B-B14F-4D97-AF65-F5344CB8AC3E}">
+        <p14:creationId xmlns:p14="http://schemas.microsoft.com/office/powerpoint/2010/main" val="1040840356"/>
+      </p:ext>
+    </p:extLst>
+  </p:cSld>
+  <p:clrMapOvr>
+    <a:masterClrMapping/>
+  </p:clrMapOvr>
+  <p:timing>
+    <p:tnLst>
+      <p:par>
+        <p:cTn id="1" dur="indefinite" restart="never" nodeType="tmRoot"/>
+      </p:par>
+    </p:tnLst>
+  </p:timing>
+</p:sld>
+</file>
+
+<file path=ppt/slides/slide19.xml><?xml version="1.0" encoding="utf-8"?>
+<p:sld xmlns:a="http://schemas.openxmlformats.org/drawingml/2006/main" xmlns:r="http://schemas.openxmlformats.org/officeDocument/2006/relationships" xmlns:p="http://schemas.openxmlformats.org/presentationml/2006/main">
+  <p:cSld>
+    <p:spTree>
+      <p:nvGrpSpPr>
+        <p:cNvPr id="1" name=""/>
+        <p:cNvGrpSpPr/>
+        <p:nvPr/>
+      </p:nvGrpSpPr>
+      <p:grpSpPr>
+        <a:xfrm>
+          <a:off x="0" y="0"/>
+          <a:ext cx="0" cy="0"/>
+          <a:chOff x="0" y="0"/>
+          <a:chExt cx="0" cy="0"/>
+        </a:xfrm>
+      </p:grpSpPr>
+      <p:pic>
+        <p:nvPicPr>
+          <p:cNvPr id="4" name="Content Placeholder 3"/>
+          <p:cNvPicPr>
+            <a:picLocks noGrp="1" noChangeAspect="1"/>
+          </p:cNvPicPr>
+          <p:nvPr>
+            <p:ph idx="1"/>
+          </p:nvPr>
+        </p:nvPicPr>
+        <p:blipFill>
+          <a:blip r:embed="rId3">
+            <a:extLst>
+              <a:ext uri="{28A0092B-C50C-407E-A947-70E740481C1C}">
+                <a14:useLocalDpi xmlns:a14="http://schemas.microsoft.com/office/drawing/2010/main" val="0"/>
+              </a:ext>
+            </a:extLst>
+          </a:blip>
+          <a:stretch>
+            <a:fillRect/>
+          </a:stretch>
+        </p:blipFill>
+        <p:spPr>
+          <a:xfrm>
+            <a:off x="194733" y="1523999"/>
+            <a:ext cx="3505695" cy="2157731"/>
+          </a:xfrm>
+        </p:spPr>
+      </p:pic>
+      <p:pic>
+        <p:nvPicPr>
+          <p:cNvPr id="5" name="Picture 4"/>
+          <p:cNvPicPr>
+            <a:picLocks noChangeAspect="1"/>
+          </p:cNvPicPr>
+          <p:nvPr/>
+        </p:nvPicPr>
+        <p:blipFill>
+          <a:blip r:embed="rId4">
+            <a:extLst>
+              <a:ext uri="{28A0092B-C50C-407E-A947-70E740481C1C}">
+                <a14:useLocalDpi xmlns:a14="http://schemas.microsoft.com/office/drawing/2010/main" val="0"/>
+              </a:ext>
+            </a:extLst>
+          </a:blip>
+          <a:stretch>
+            <a:fillRect/>
+          </a:stretch>
+        </p:blipFill>
+        <p:spPr>
+          <a:xfrm>
+            <a:off x="166446" y="3810000"/>
+            <a:ext cx="3567354" cy="2195682"/>
+          </a:xfrm>
+          <a:prstGeom prst="rect">
+            <a:avLst/>
+          </a:prstGeom>
+        </p:spPr>
+      </p:pic>
+      <p:pic>
+        <p:nvPicPr>
+          <p:cNvPr id="6" name="Picture 5"/>
+          <p:cNvPicPr>
+            <a:picLocks noChangeAspect="1"/>
+          </p:cNvPicPr>
+          <p:nvPr/>
+        </p:nvPicPr>
+        <p:blipFill>
+          <a:blip r:embed="rId5">
+            <a:extLst>
+              <a:ext uri="{28A0092B-C50C-407E-A947-70E740481C1C}">
+                <a14:useLocalDpi xmlns:a14="http://schemas.microsoft.com/office/drawing/2010/main" val="0"/>
+              </a:ext>
+            </a:extLst>
+          </a:blip>
+          <a:stretch>
+            <a:fillRect/>
+          </a:stretch>
+        </p:blipFill>
+        <p:spPr>
+          <a:xfrm>
+            <a:off x="3810000" y="1523999"/>
+            <a:ext cx="5181600" cy="2166199"/>
+          </a:xfrm>
+          <a:prstGeom prst="rect">
+            <a:avLst/>
+          </a:prstGeom>
+        </p:spPr>
+      </p:pic>
+      <p:pic>
+        <p:nvPicPr>
+          <p:cNvPr id="7" name="Picture 6"/>
+          <p:cNvPicPr>
+            <a:picLocks noChangeAspect="1"/>
+          </p:cNvPicPr>
+          <p:nvPr/>
+        </p:nvPicPr>
+        <p:blipFill>
+          <a:blip r:embed="rId6">
+            <a:extLst>
+              <a:ext uri="{28A0092B-C50C-407E-A947-70E740481C1C}">
+                <a14:useLocalDpi xmlns:a14="http://schemas.microsoft.com/office/drawing/2010/main" val="0"/>
+              </a:ext>
+            </a:extLst>
+          </a:blip>
+          <a:stretch>
+            <a:fillRect/>
+          </a:stretch>
+        </p:blipFill>
+        <p:spPr>
+          <a:xfrm>
+            <a:off x="3894666" y="3840164"/>
+            <a:ext cx="5096933" cy="2594035"/>
+          </a:xfrm>
+          <a:prstGeom prst="rect">
+            <a:avLst/>
+          </a:prstGeom>
+        </p:spPr>
+      </p:pic>
+      <p:sp>
+        <p:nvSpPr>
+          <p:cNvPr id="8" name="Title 1"/>
+          <p:cNvSpPr>
+            <a:spLocks noGrp="1"/>
+          </p:cNvSpPr>
+          <p:nvPr>
+            <p:ph type="title"/>
+          </p:nvPr>
+        </p:nvSpPr>
+        <p:spPr/>
+        <p:txBody>
+          <a:bodyPr/>
+          <a:lstStyle/>
+          <a:p>
+            <a:r>
+              <a:rPr lang="en-US" dirty="0" smtClean="0"/>
+              <a:t>Education, Income Face Off!</a:t>
+            </a:r>
+            <a:endParaRPr lang="en-US" dirty="0"/>
+          </a:p>
+        </p:txBody>
+      </p:sp>
+    </p:spTree>
+    <p:extLst>
+      <p:ext uri="{BB962C8B-B14F-4D97-AF65-F5344CB8AC3E}">
+        <p14:creationId xmlns:p14="http://schemas.microsoft.com/office/powerpoint/2010/main" val="3931512834"/>
+      </p:ext>
+    </p:extLst>
+  </p:cSld>
+  <p:clrMapOvr>
+    <a:masterClrMapping/>
+  </p:clrMapOvr>
+  <p:timing>
+    <p:tnLst>
+      <p:par>
+        <p:cTn id="1" dur="indefinite" restart="never" nodeType="tmRoot"/>
+      </p:par>
+    </p:tnLst>
+  </p:timing>
 </p:sld>
 </file>
 
 <file path=ppt/slides/slide2.xml><?xml version="1.0" encoding="utf-8"?>
+<p:sld xmlns:a="http://schemas.openxmlformats.org/drawingml/2006/main" xmlns:r="http://schemas.openxmlformats.org/officeDocument/2006/relationships" xmlns:p="http://schemas.openxmlformats.org/presentationml/2006/main">
+  <p:cSld>
+    <p:spTree>
+      <p:nvGrpSpPr>
+        <p:cNvPr id="1" name=""/>
+        <p:cNvGrpSpPr/>
+        <p:nvPr/>
+      </p:nvGrpSpPr>
+      <p:grpSpPr>
+        <a:xfrm>
+          <a:off x="0" y="0"/>
+          <a:ext cx="0" cy="0"/>
+          <a:chOff x="0" y="0"/>
+          <a:chExt cx="0" cy="0"/>
+        </a:xfrm>
+      </p:grpSpPr>
+      <p:sp>
+        <p:nvSpPr>
+          <p:cNvPr id="3" name="Content Placeholder 2"/>
+          <p:cNvSpPr>
+            <a:spLocks noGrp="1"/>
+          </p:cNvSpPr>
+          <p:nvPr>
+            <p:ph idx="1"/>
+          </p:nvPr>
+        </p:nvSpPr>
+        <p:spPr>
+          <a:xfrm>
+            <a:off x="457200" y="304800"/>
+            <a:ext cx="8229600" cy="5821363"/>
+          </a:xfrm>
+        </p:spPr>
+        <p:txBody>
+          <a:bodyPr>
+            <a:normAutofit/>
+          </a:bodyPr>
+          <a:lstStyle/>
+          <a:p>
+            <a:pPr marL="0" indent="0">
+              <a:buNone/>
+            </a:pPr>
+            <a:r>
+              <a:rPr lang="en-US" sz="1300" dirty="0" smtClean="0"/>
+              <a:t>Anyone who has Born, has to Die! Everyone has their own Excuse of giving up this Life.</a:t>
+            </a:r>
+          </a:p>
+          <a:p>
+            <a:pPr marL="0" indent="0">
+              <a:buNone/>
+            </a:pPr>
+            <a:r>
+              <a:rPr lang="en-US" sz="1300" dirty="0" smtClean="0"/>
+              <a:t>Many of them happen due to Health reasons, or Natural Calamities, like Earthquake or Havocs, etc. But, there are also Incidents when people give up on their Life willingly. Yes, they commit SUICIDE!</a:t>
+            </a:r>
+          </a:p>
+          <a:p>
+            <a:pPr marL="0" indent="0">
+              <a:buNone/>
+            </a:pPr>
+            <a:r>
+              <a:rPr lang="en-US" sz="1300" dirty="0" smtClean="0"/>
+              <a:t>What </a:t>
+            </a:r>
+            <a:r>
+              <a:rPr lang="en-US" sz="1300" dirty="0"/>
+              <a:t>are the possible factors, that lead them to take such an Action?</a:t>
+            </a:r>
+          </a:p>
+          <a:p>
+            <a:pPr marL="0" indent="0">
+              <a:buNone/>
+            </a:pPr>
+            <a:r>
+              <a:rPr lang="en-US" sz="1300" dirty="0"/>
+              <a:t>Is it because of Financial Reasons, Health Issues, being Alone, or Personal Tragedies.</a:t>
+            </a:r>
+          </a:p>
+          <a:p>
+            <a:pPr marL="0" indent="0">
+              <a:buNone/>
+            </a:pPr>
+            <a:endParaRPr lang="en-US" dirty="0"/>
+          </a:p>
+        </p:txBody>
+      </p:sp>
+      <p:pic>
+        <p:nvPicPr>
+          <p:cNvPr id="20484" name="Picture 4"/>
+          <p:cNvPicPr>
+            <a:picLocks noChangeAspect="1" noChangeArrowheads="1"/>
+          </p:cNvPicPr>
+          <p:nvPr/>
+        </p:nvPicPr>
+        <p:blipFill>
+          <a:blip r:embed="rId2">
+            <a:extLst>
+              <a:ext uri="{28A0092B-C50C-407E-A947-70E740481C1C}">
+                <a14:useLocalDpi xmlns:a14="http://schemas.microsoft.com/office/drawing/2010/main" val="0"/>
+              </a:ext>
+            </a:extLst>
+          </a:blip>
+          <a:srcRect/>
+          <a:stretch>
+            <a:fillRect/>
+          </a:stretch>
+        </p:blipFill>
+        <p:spPr bwMode="auto">
+          <a:xfrm>
+            <a:off x="838200" y="1751782"/>
+            <a:ext cx="7391400" cy="4930006"/>
+          </a:xfrm>
+          <a:prstGeom prst="rect">
+            <a:avLst/>
+          </a:prstGeom>
+          <a:noFill/>
+          <a:ln>
+            <a:noFill/>
+          </a:ln>
+          <a:effectLst/>
+          <a:extLst>
+            <a:ext uri="{909E8E84-426E-40DD-AFC4-6F175D3DCCD1}">
+              <a14:hiddenFill xmlns:a14="http://schemas.microsoft.com/office/drawing/2010/main">
+                <a:solidFill>
+                  <a:schemeClr val="accent1"/>
+                </a:solidFill>
+              </a14:hiddenFill>
+            </a:ext>
+            <a:ext uri="{91240B29-F687-4F45-9708-019B960494DF}">
+              <a14:hiddenLine xmlns:a14="http://schemas.microsoft.com/office/drawing/2010/main" w="9525">
+                <a:solidFill>
+                  <a:schemeClr val="tx1"/>
+                </a:solidFill>
+                <a:miter lim="800000"/>
+                <a:headEnd/>
+                <a:tailEnd/>
+              </a14:hiddenLine>
+            </a:ext>
+            <a:ext uri="{AF507438-7753-43E0-B8FC-AC1667EBCBE1}">
+              <a14:hiddenEffects xmlns:a14="http://schemas.microsoft.com/office/drawing/2010/main">
+                <a:effectLst>
+                  <a:outerShdw dist="35921" dir="2700000" algn="ctr" rotWithShape="0">
+                    <a:schemeClr val="bg2"/>
+                  </a:outerShdw>
+                </a:effectLst>
+              </a14:hiddenEffects>
+            </a:ext>
+          </a:extLst>
+        </p:spPr>
+      </p:pic>
+    </p:spTree>
+    <p:extLst>
+      <p:ext uri="{BB962C8B-B14F-4D97-AF65-F5344CB8AC3E}">
+        <p14:creationId xmlns:p14="http://schemas.microsoft.com/office/powerpoint/2010/main" val="2101780473"/>
+      </p:ext>
+    </p:extLst>
+  </p:cSld>
+  <p:clrMapOvr>
+    <a:masterClrMapping/>
+  </p:clrMapOvr>
+  <p:timing>
+    <p:tnLst>
+      <p:par>
+        <p:cTn id="1" dur="indefinite" restart="never" nodeType="tmRoot"/>
+      </p:par>
+    </p:tnLst>
+  </p:timing>
+</p:sld>
+</file>
+
+<file path=ppt/slides/slide20.xml><?xml version="1.0" encoding="utf-8"?>
+<p:sld xmlns:a="http://schemas.openxmlformats.org/drawingml/2006/main" xmlns:r="http://schemas.openxmlformats.org/officeDocument/2006/relationships" xmlns:p="http://schemas.openxmlformats.org/presentationml/2006/main">
+  <p:cSld>
+    <p:spTree>
+      <p:nvGrpSpPr>
+        <p:cNvPr id="1" name=""/>
+        <p:cNvGrpSpPr/>
+        <p:nvPr/>
+      </p:nvGrpSpPr>
+      <p:grpSpPr>
+        <a:xfrm>
+          <a:off x="0" y="0"/>
+          <a:ext cx="0" cy="0"/>
+          <a:chOff x="0" y="0"/>
+          <a:chExt cx="0" cy="0"/>
+        </a:xfrm>
+      </p:grpSpPr>
+      <p:sp>
+        <p:nvSpPr>
+          <p:cNvPr id="2" name="Title 1"/>
+          <p:cNvSpPr>
+            <a:spLocks noGrp="1"/>
+          </p:cNvSpPr>
+          <p:nvPr>
+            <p:ph type="title"/>
+          </p:nvPr>
+        </p:nvSpPr>
+        <p:spPr/>
+        <p:txBody>
+          <a:bodyPr>
+            <a:normAutofit/>
+          </a:bodyPr>
+          <a:lstStyle/>
+          <a:p>
+            <a:r>
+              <a:rPr lang="en-US" sz="2800" dirty="0" smtClean="0"/>
+              <a:t>Are they more of Working people, or the Unemployed?</a:t>
+            </a:r>
+            <a:endParaRPr lang="en-US" sz="2800" dirty="0"/>
+          </a:p>
+        </p:txBody>
+      </p:sp>
+      <p:pic>
+        <p:nvPicPr>
+          <p:cNvPr id="16386" name="Picture 2"/>
+          <p:cNvPicPr>
+            <a:picLocks noGrp="1" noChangeAspect="1" noChangeArrowheads="1"/>
+          </p:cNvPicPr>
+          <p:nvPr>
+            <p:ph idx="1"/>
+          </p:nvPr>
+        </p:nvPicPr>
+        <p:blipFill>
+          <a:blip r:embed="rId3">
+            <a:extLst>
+              <a:ext uri="{28A0092B-C50C-407E-A947-70E740481C1C}">
+                <a14:useLocalDpi xmlns:a14="http://schemas.microsoft.com/office/drawing/2010/main" val="0"/>
+              </a:ext>
+            </a:extLst>
+          </a:blip>
+          <a:srcRect/>
+          <a:stretch>
+            <a:fillRect/>
+          </a:stretch>
+        </p:blipFill>
+        <p:spPr bwMode="auto">
+          <a:xfrm>
+            <a:off x="2438400" y="1219200"/>
+            <a:ext cx="3429000" cy="2116183"/>
+          </a:xfrm>
+          <a:prstGeom prst="rect">
+            <a:avLst/>
+          </a:prstGeom>
+          <a:noFill/>
+          <a:ln>
+            <a:noFill/>
+          </a:ln>
+          <a:effectLst/>
+          <a:extLst>
+            <a:ext uri="{909E8E84-426E-40DD-AFC4-6F175D3DCCD1}">
+              <a14:hiddenFill xmlns:a14="http://schemas.microsoft.com/office/drawing/2010/main">
+                <a:solidFill>
+                  <a:schemeClr val="accent1"/>
+                </a:solidFill>
+              </a14:hiddenFill>
+            </a:ext>
+            <a:ext uri="{91240B29-F687-4F45-9708-019B960494DF}">
+              <a14:hiddenLine xmlns:a14="http://schemas.microsoft.com/office/drawing/2010/main" w="9525">
+                <a:solidFill>
+                  <a:schemeClr val="tx1"/>
+                </a:solidFill>
+                <a:miter lim="800000"/>
+                <a:headEnd/>
+                <a:tailEnd/>
+              </a14:hiddenLine>
+            </a:ext>
+            <a:ext uri="{AF507438-7753-43E0-B8FC-AC1667EBCBE1}">
+              <a14:hiddenEffects xmlns:a14="http://schemas.microsoft.com/office/drawing/2010/main">
+                <a:effectLst>
+                  <a:outerShdw dist="35921" dir="2700000" algn="ctr" rotWithShape="0">
+                    <a:schemeClr val="bg2"/>
+                  </a:outerShdw>
+                </a:effectLst>
+              </a14:hiddenEffects>
+            </a:ext>
+          </a:extLst>
+        </p:spPr>
+      </p:pic>
+      <p:pic>
+        <p:nvPicPr>
+          <p:cNvPr id="16387" name="Picture 3"/>
+          <p:cNvPicPr>
+            <a:picLocks noChangeAspect="1" noChangeArrowheads="1"/>
+          </p:cNvPicPr>
+          <p:nvPr/>
+        </p:nvPicPr>
+        <p:blipFill>
+          <a:blip r:embed="rId4">
+            <a:extLst>
+              <a:ext uri="{28A0092B-C50C-407E-A947-70E740481C1C}">
+                <a14:useLocalDpi xmlns:a14="http://schemas.microsoft.com/office/drawing/2010/main" val="0"/>
+              </a:ext>
+            </a:extLst>
+          </a:blip>
+          <a:srcRect/>
+          <a:stretch>
+            <a:fillRect/>
+          </a:stretch>
+        </p:blipFill>
+        <p:spPr bwMode="auto">
+          <a:xfrm>
+            <a:off x="381000" y="3436023"/>
+            <a:ext cx="7620000" cy="3269577"/>
+          </a:xfrm>
+          <a:prstGeom prst="rect">
+            <a:avLst/>
+          </a:prstGeom>
+          <a:noFill/>
+          <a:ln>
+            <a:noFill/>
+          </a:ln>
+          <a:effectLst/>
+          <a:extLst>
+            <a:ext uri="{909E8E84-426E-40DD-AFC4-6F175D3DCCD1}">
+              <a14:hiddenFill xmlns:a14="http://schemas.microsoft.com/office/drawing/2010/main">
+                <a:solidFill>
+                  <a:schemeClr val="accent1"/>
+                </a:solidFill>
+              </a14:hiddenFill>
+            </a:ext>
+            <a:ext uri="{91240B29-F687-4F45-9708-019B960494DF}">
+              <a14:hiddenLine xmlns:a14="http://schemas.microsoft.com/office/drawing/2010/main" w="9525">
+                <a:solidFill>
+                  <a:schemeClr val="tx1"/>
+                </a:solidFill>
+                <a:miter lim="800000"/>
+                <a:headEnd/>
+                <a:tailEnd/>
+              </a14:hiddenLine>
+            </a:ext>
+            <a:ext uri="{AF507438-7753-43E0-B8FC-AC1667EBCBE1}">
+              <a14:hiddenEffects xmlns:a14="http://schemas.microsoft.com/office/drawing/2010/main">
+                <a:effectLst>
+                  <a:outerShdw dist="35921" dir="2700000" algn="ctr" rotWithShape="0">
+                    <a:schemeClr val="bg2"/>
+                  </a:outerShdw>
+                </a:effectLst>
+              </a14:hiddenEffects>
+            </a:ext>
+          </a:extLst>
+        </p:spPr>
+      </p:pic>
+    </p:spTree>
+    <p:extLst>
+      <p:ext uri="{BB962C8B-B14F-4D97-AF65-F5344CB8AC3E}">
+        <p14:creationId xmlns:p14="http://schemas.microsoft.com/office/powerpoint/2010/main" val="673016778"/>
+      </p:ext>
+    </p:extLst>
+  </p:cSld>
+  <p:clrMapOvr>
+    <a:masterClrMapping/>
+  </p:clrMapOvr>
+  <p:timing>
+    <p:tnLst>
+      <p:par>
+        <p:cTn id="1" dur="indefinite" restart="never" nodeType="tmRoot"/>
+      </p:par>
+    </p:tnLst>
+  </p:timing>
+</p:sld>
+</file>
+
+<file path=ppt/slides/slide21.xml><?xml version="1.0" encoding="utf-8"?>
+<p:sld xmlns:a="http://schemas.openxmlformats.org/drawingml/2006/main" xmlns:r="http://schemas.openxmlformats.org/officeDocument/2006/relationships" xmlns:p="http://schemas.openxmlformats.org/presentationml/2006/main">
+  <p:cSld>
+    <p:spTree>
+      <p:nvGrpSpPr>
+        <p:cNvPr id="1" name=""/>
+        <p:cNvGrpSpPr/>
+        <p:nvPr/>
+      </p:nvGrpSpPr>
+      <p:grpSpPr>
+        <a:xfrm>
+          <a:off x="0" y="0"/>
+          <a:ext cx="0" cy="0"/>
+          <a:chOff x="0" y="0"/>
+          <a:chExt cx="0" cy="0"/>
+        </a:xfrm>
+      </p:grpSpPr>
+      <p:sp>
+        <p:nvSpPr>
+          <p:cNvPr id="2" name="Title 1"/>
+          <p:cNvSpPr>
+            <a:spLocks noGrp="1"/>
+          </p:cNvSpPr>
+          <p:nvPr>
+            <p:ph type="title"/>
+          </p:nvPr>
+        </p:nvSpPr>
+        <p:spPr/>
+        <p:txBody>
+          <a:bodyPr/>
+          <a:lstStyle/>
+          <a:p>
+            <a:r>
+              <a:rPr lang="en-US" dirty="0" smtClean="0"/>
+              <a:t>Hispanic </a:t>
+            </a:r>
+            <a:r>
+              <a:rPr lang="en-US" dirty="0" err="1" smtClean="0"/>
+              <a:t>vs</a:t>
+            </a:r>
+            <a:r>
+              <a:rPr lang="en-US" dirty="0" smtClean="0"/>
+              <a:t> Native?</a:t>
+            </a:r>
+            <a:endParaRPr lang="en-US" dirty="0"/>
+          </a:p>
+        </p:txBody>
+      </p:sp>
+      <p:pic>
+        <p:nvPicPr>
+          <p:cNvPr id="17410" name="Picture 2"/>
+          <p:cNvPicPr>
+            <a:picLocks noGrp="1" noChangeAspect="1" noChangeArrowheads="1"/>
+          </p:cNvPicPr>
+          <p:nvPr>
+            <p:ph idx="1"/>
+          </p:nvPr>
+        </p:nvPicPr>
+        <p:blipFill>
+          <a:blip r:embed="rId2">
+            <a:extLst>
+              <a:ext uri="{28A0092B-C50C-407E-A947-70E740481C1C}">
+                <a14:useLocalDpi xmlns:a14="http://schemas.microsoft.com/office/drawing/2010/main" val="0"/>
+              </a:ext>
+            </a:extLst>
+          </a:blip>
+          <a:srcRect/>
+          <a:stretch>
+            <a:fillRect/>
+          </a:stretch>
+        </p:blipFill>
+        <p:spPr bwMode="auto">
+          <a:xfrm>
+            <a:off x="1633347" y="1219200"/>
+            <a:ext cx="5712713" cy="2133600"/>
+          </a:xfrm>
+          <a:prstGeom prst="rect">
+            <a:avLst/>
+          </a:prstGeom>
+          <a:noFill/>
+          <a:ln>
+            <a:noFill/>
+          </a:ln>
+          <a:effectLst/>
+          <a:extLst>
+            <a:ext uri="{909E8E84-426E-40DD-AFC4-6F175D3DCCD1}">
+              <a14:hiddenFill xmlns:a14="http://schemas.microsoft.com/office/drawing/2010/main">
+                <a:solidFill>
+                  <a:schemeClr val="accent1"/>
+                </a:solidFill>
+              </a14:hiddenFill>
+            </a:ext>
+            <a:ext uri="{91240B29-F687-4F45-9708-019B960494DF}">
+              <a14:hiddenLine xmlns:a14="http://schemas.microsoft.com/office/drawing/2010/main" w="9525">
+                <a:solidFill>
+                  <a:schemeClr val="tx1"/>
+                </a:solidFill>
+                <a:miter lim="800000"/>
+                <a:headEnd/>
+                <a:tailEnd/>
+              </a14:hiddenLine>
+            </a:ext>
+            <a:ext uri="{AF507438-7753-43E0-B8FC-AC1667EBCBE1}">
+              <a14:hiddenEffects xmlns:a14="http://schemas.microsoft.com/office/drawing/2010/main">
+                <a:effectLst>
+                  <a:outerShdw dist="35921" dir="2700000" algn="ctr" rotWithShape="0">
+                    <a:schemeClr val="bg2"/>
+                  </a:outerShdw>
+                </a:effectLst>
+              </a14:hiddenEffects>
+            </a:ext>
+          </a:extLst>
+        </p:spPr>
+      </p:pic>
+      <p:pic>
+        <p:nvPicPr>
+          <p:cNvPr id="17411" name="Picture 3"/>
+          <p:cNvPicPr>
+            <a:picLocks noChangeAspect="1" noChangeArrowheads="1"/>
+          </p:cNvPicPr>
+          <p:nvPr/>
+        </p:nvPicPr>
+        <p:blipFill>
+          <a:blip r:embed="rId3">
+            <a:extLst>
+              <a:ext uri="{28A0092B-C50C-407E-A947-70E740481C1C}">
+                <a14:useLocalDpi xmlns:a14="http://schemas.microsoft.com/office/drawing/2010/main" val="0"/>
+              </a:ext>
+            </a:extLst>
+          </a:blip>
+          <a:srcRect/>
+          <a:stretch>
+            <a:fillRect/>
+          </a:stretch>
+        </p:blipFill>
+        <p:spPr bwMode="auto">
+          <a:xfrm>
+            <a:off x="228600" y="3429000"/>
+            <a:ext cx="8305800" cy="3386666"/>
+          </a:xfrm>
+          <a:prstGeom prst="rect">
+            <a:avLst/>
+          </a:prstGeom>
+          <a:noFill/>
+          <a:ln>
+            <a:noFill/>
+          </a:ln>
+          <a:effectLst/>
+          <a:extLst>
+            <a:ext uri="{909E8E84-426E-40DD-AFC4-6F175D3DCCD1}">
+              <a14:hiddenFill xmlns:a14="http://schemas.microsoft.com/office/drawing/2010/main">
+                <a:solidFill>
+                  <a:schemeClr val="accent1"/>
+                </a:solidFill>
+              </a14:hiddenFill>
+            </a:ext>
+            <a:ext uri="{91240B29-F687-4F45-9708-019B960494DF}">
+              <a14:hiddenLine xmlns:a14="http://schemas.microsoft.com/office/drawing/2010/main" w="9525">
+                <a:solidFill>
+                  <a:schemeClr val="tx1"/>
+                </a:solidFill>
+                <a:miter lim="800000"/>
+                <a:headEnd/>
+                <a:tailEnd/>
+              </a14:hiddenLine>
+            </a:ext>
+            <a:ext uri="{AF507438-7753-43E0-B8FC-AC1667EBCBE1}">
+              <a14:hiddenEffects xmlns:a14="http://schemas.microsoft.com/office/drawing/2010/main">
+                <a:effectLst>
+                  <a:outerShdw dist="35921" dir="2700000" algn="ctr" rotWithShape="0">
+                    <a:schemeClr val="bg2"/>
+                  </a:outerShdw>
+                </a:effectLst>
+              </a14:hiddenEffects>
+            </a:ext>
+          </a:extLst>
+        </p:spPr>
+      </p:pic>
+    </p:spTree>
+    <p:extLst>
+      <p:ext uri="{BB962C8B-B14F-4D97-AF65-F5344CB8AC3E}">
+        <p14:creationId xmlns:p14="http://schemas.microsoft.com/office/powerpoint/2010/main" val="2176918673"/>
+      </p:ext>
+    </p:extLst>
+  </p:cSld>
+  <p:clrMapOvr>
+    <a:masterClrMapping/>
+  </p:clrMapOvr>
+  <p:timing>
+    <p:tnLst>
+      <p:par>
+        <p:cTn id="1" dur="indefinite" restart="never" nodeType="tmRoot"/>
+      </p:par>
+    </p:tnLst>
+  </p:timing>
+</p:sld>
+</file>
+
+<file path=ppt/slides/slide22.xml><?xml version="1.0" encoding="utf-8"?>
+<p:sld xmlns:a="http://schemas.openxmlformats.org/drawingml/2006/main" xmlns:r="http://schemas.openxmlformats.org/officeDocument/2006/relationships" xmlns:p="http://schemas.openxmlformats.org/presentationml/2006/main">
+  <p:cSld>
+    <p:spTree>
+      <p:nvGrpSpPr>
+        <p:cNvPr id="1" name=""/>
+        <p:cNvGrpSpPr/>
+        <p:nvPr/>
+      </p:nvGrpSpPr>
+      <p:grpSpPr>
+        <a:xfrm>
+          <a:off x="0" y="0"/>
+          <a:ext cx="0" cy="0"/>
+          <a:chOff x="0" y="0"/>
+          <a:chExt cx="0" cy="0"/>
+        </a:xfrm>
+      </p:grpSpPr>
+      <p:sp>
+        <p:nvSpPr>
+          <p:cNvPr id="2" name="Title 1"/>
+          <p:cNvSpPr>
+            <a:spLocks noGrp="1"/>
+          </p:cNvSpPr>
+          <p:nvPr>
+            <p:ph type="title"/>
+          </p:nvPr>
+        </p:nvSpPr>
+        <p:spPr/>
+        <p:txBody>
+          <a:bodyPr>
+            <a:normAutofit fontScale="90000"/>
+          </a:bodyPr>
+          <a:lstStyle/>
+          <a:p>
+            <a:r>
+              <a:rPr lang="en-US" dirty="0" smtClean="0"/>
+              <a:t>Living in Urban area, own House a reason?</a:t>
+            </a:r>
+            <a:endParaRPr lang="en-US" dirty="0"/>
+          </a:p>
+        </p:txBody>
+      </p:sp>
+      <p:pic>
+        <p:nvPicPr>
+          <p:cNvPr id="18434" name="Picture 2"/>
+          <p:cNvPicPr>
+            <a:picLocks noGrp="1" noChangeAspect="1" noChangeArrowheads="1"/>
+          </p:cNvPicPr>
+          <p:nvPr>
+            <p:ph idx="1"/>
+          </p:nvPr>
+        </p:nvPicPr>
+        <p:blipFill>
+          <a:blip r:embed="rId3" cstate="print">
+            <a:extLst>
+              <a:ext uri="{28A0092B-C50C-407E-A947-70E740481C1C}">
+                <a14:useLocalDpi xmlns:a14="http://schemas.microsoft.com/office/drawing/2010/main" val="0"/>
+              </a:ext>
+            </a:extLst>
+          </a:blip>
+          <a:srcRect/>
+          <a:stretch>
+            <a:fillRect/>
+          </a:stretch>
+        </p:blipFill>
+        <p:spPr bwMode="auto">
+          <a:xfrm>
+            <a:off x="457199" y="1371600"/>
+            <a:ext cx="3951111" cy="2438400"/>
+          </a:xfrm>
+          <a:prstGeom prst="rect">
+            <a:avLst/>
+          </a:prstGeom>
+          <a:noFill/>
+          <a:ln>
+            <a:noFill/>
+          </a:ln>
+          <a:effectLst/>
+          <a:extLst>
+            <a:ext uri="{909E8E84-426E-40DD-AFC4-6F175D3DCCD1}">
+              <a14:hiddenFill xmlns:a14="http://schemas.microsoft.com/office/drawing/2010/main">
+                <a:solidFill>
+                  <a:schemeClr val="accent1"/>
+                </a:solidFill>
+              </a14:hiddenFill>
+            </a:ext>
+            <a:ext uri="{91240B29-F687-4F45-9708-019B960494DF}">
+              <a14:hiddenLine xmlns:a14="http://schemas.microsoft.com/office/drawing/2010/main" w="9525">
+                <a:solidFill>
+                  <a:schemeClr val="tx1"/>
+                </a:solidFill>
+                <a:miter lim="800000"/>
+                <a:headEnd/>
+                <a:tailEnd/>
+              </a14:hiddenLine>
+            </a:ext>
+            <a:ext uri="{AF507438-7753-43E0-B8FC-AC1667EBCBE1}">
+              <a14:hiddenEffects xmlns:a14="http://schemas.microsoft.com/office/drawing/2010/main">
+                <a:effectLst>
+                  <a:outerShdw dist="35921" dir="2700000" algn="ctr" rotWithShape="0">
+                    <a:schemeClr val="bg2"/>
+                  </a:outerShdw>
+                </a:effectLst>
+              </a14:hiddenEffects>
+            </a:ext>
+          </a:extLst>
+        </p:spPr>
+      </p:pic>
+      <p:pic>
+        <p:nvPicPr>
+          <p:cNvPr id="18436" name="Picture 4"/>
+          <p:cNvPicPr>
+            <a:picLocks noChangeAspect="1" noChangeArrowheads="1"/>
+          </p:cNvPicPr>
+          <p:nvPr/>
+        </p:nvPicPr>
+        <p:blipFill>
+          <a:blip r:embed="rId4">
+            <a:extLst>
+              <a:ext uri="{28A0092B-C50C-407E-A947-70E740481C1C}">
+                <a14:useLocalDpi xmlns:a14="http://schemas.microsoft.com/office/drawing/2010/main" val="0"/>
+              </a:ext>
+            </a:extLst>
+          </a:blip>
+          <a:srcRect/>
+          <a:stretch>
+            <a:fillRect/>
+          </a:stretch>
+        </p:blipFill>
+        <p:spPr bwMode="auto">
+          <a:xfrm>
+            <a:off x="4648200" y="1371600"/>
+            <a:ext cx="3950172" cy="2438400"/>
+          </a:xfrm>
+          <a:prstGeom prst="rect">
+            <a:avLst/>
+          </a:prstGeom>
+          <a:noFill/>
+          <a:ln>
+            <a:noFill/>
+          </a:ln>
+          <a:effectLst/>
+          <a:extLst>
+            <a:ext uri="{909E8E84-426E-40DD-AFC4-6F175D3DCCD1}">
+              <a14:hiddenFill xmlns:a14="http://schemas.microsoft.com/office/drawing/2010/main">
+                <a:solidFill>
+                  <a:schemeClr val="accent1"/>
+                </a:solidFill>
+              </a14:hiddenFill>
+            </a:ext>
+            <a:ext uri="{91240B29-F687-4F45-9708-019B960494DF}">
+              <a14:hiddenLine xmlns:a14="http://schemas.microsoft.com/office/drawing/2010/main" w="9525">
+                <a:solidFill>
+                  <a:schemeClr val="tx1"/>
+                </a:solidFill>
+                <a:miter lim="800000"/>
+                <a:headEnd/>
+                <a:tailEnd/>
+              </a14:hiddenLine>
+            </a:ext>
+            <a:ext uri="{AF507438-7753-43E0-B8FC-AC1667EBCBE1}">
+              <a14:hiddenEffects xmlns:a14="http://schemas.microsoft.com/office/drawing/2010/main">
+                <a:effectLst>
+                  <a:outerShdw dist="35921" dir="2700000" algn="ctr" rotWithShape="0">
+                    <a:schemeClr val="bg2"/>
+                  </a:outerShdw>
+                </a:effectLst>
+              </a14:hiddenEffects>
+            </a:ext>
+          </a:extLst>
+        </p:spPr>
+      </p:pic>
+      <p:pic>
+        <p:nvPicPr>
+          <p:cNvPr id="18437" name="Picture 5"/>
+          <p:cNvPicPr>
+            <a:picLocks noChangeAspect="1" noChangeArrowheads="1"/>
+          </p:cNvPicPr>
+          <p:nvPr/>
+        </p:nvPicPr>
+        <p:blipFill>
+          <a:blip r:embed="rId5">
+            <a:extLst>
+              <a:ext uri="{28A0092B-C50C-407E-A947-70E740481C1C}">
+                <a14:useLocalDpi xmlns:a14="http://schemas.microsoft.com/office/drawing/2010/main" val="0"/>
+              </a:ext>
+            </a:extLst>
+          </a:blip>
+          <a:srcRect/>
+          <a:stretch>
+            <a:fillRect/>
+          </a:stretch>
+        </p:blipFill>
+        <p:spPr bwMode="auto">
+          <a:xfrm>
+            <a:off x="2209800" y="3847601"/>
+            <a:ext cx="4876799" cy="3010398"/>
+          </a:xfrm>
+          <a:prstGeom prst="rect">
+            <a:avLst/>
+          </a:prstGeom>
+          <a:noFill/>
+          <a:ln>
+            <a:noFill/>
+          </a:ln>
+          <a:effectLst/>
+          <a:extLst>
+            <a:ext uri="{909E8E84-426E-40DD-AFC4-6F175D3DCCD1}">
+              <a14:hiddenFill xmlns:a14="http://schemas.microsoft.com/office/drawing/2010/main">
+                <a:solidFill>
+                  <a:schemeClr val="accent1"/>
+                </a:solidFill>
+              </a14:hiddenFill>
+            </a:ext>
+            <a:ext uri="{91240B29-F687-4F45-9708-019B960494DF}">
+              <a14:hiddenLine xmlns:a14="http://schemas.microsoft.com/office/drawing/2010/main" w="9525">
+                <a:solidFill>
+                  <a:schemeClr val="tx1"/>
+                </a:solidFill>
+                <a:miter lim="800000"/>
+                <a:headEnd/>
+                <a:tailEnd/>
+              </a14:hiddenLine>
+            </a:ext>
+            <a:ext uri="{AF507438-7753-43E0-B8FC-AC1667EBCBE1}">
+              <a14:hiddenEffects xmlns:a14="http://schemas.microsoft.com/office/drawing/2010/main">
+                <a:effectLst>
+                  <a:outerShdw dist="35921" dir="2700000" algn="ctr" rotWithShape="0">
+                    <a:schemeClr val="bg2"/>
+                  </a:outerShdw>
+                </a:effectLst>
+              </a14:hiddenEffects>
+            </a:ext>
+          </a:extLst>
+        </p:spPr>
+      </p:pic>
+    </p:spTree>
+    <p:extLst>
+      <p:ext uri="{BB962C8B-B14F-4D97-AF65-F5344CB8AC3E}">
+        <p14:creationId xmlns:p14="http://schemas.microsoft.com/office/powerpoint/2010/main" val="2063187234"/>
+      </p:ext>
+    </p:extLst>
+  </p:cSld>
+  <p:clrMapOvr>
+    <a:masterClrMapping/>
+  </p:clrMapOvr>
+  <p:timing>
+    <p:tnLst>
+      <p:par>
+        <p:cTn id="1" dur="indefinite" restart="never" nodeType="tmRoot"/>
+      </p:par>
+    </p:tnLst>
+  </p:timing>
+</p:sld>
+</file>
+
+<file path=ppt/slides/slide23.xml><?xml version="1.0" encoding="utf-8"?>
+<p:sld xmlns:a="http://schemas.openxmlformats.org/drawingml/2006/main" xmlns:r="http://schemas.openxmlformats.org/officeDocument/2006/relationships" xmlns:p="http://schemas.openxmlformats.org/presentationml/2006/main">
+  <p:cSld>
+    <p:spTree>
+      <p:nvGrpSpPr>
+        <p:cNvPr id="1" name=""/>
+        <p:cNvGrpSpPr/>
+        <p:nvPr/>
+      </p:nvGrpSpPr>
+      <p:grpSpPr>
+        <a:xfrm>
+          <a:off x="0" y="0"/>
+          <a:ext cx="0" cy="0"/>
+          <a:chOff x="0" y="0"/>
+          <a:chExt cx="0" cy="0"/>
+        </a:xfrm>
+      </p:grpSpPr>
+      <p:sp>
+        <p:nvSpPr>
+          <p:cNvPr id="2" name="Title 1"/>
+          <p:cNvSpPr>
+            <a:spLocks noGrp="1"/>
+          </p:cNvSpPr>
+          <p:nvPr>
+            <p:ph type="title"/>
+          </p:nvPr>
+        </p:nvSpPr>
+        <p:spPr/>
+        <p:txBody>
+          <a:bodyPr>
+            <a:normAutofit fontScale="90000"/>
+          </a:bodyPr>
+          <a:lstStyle/>
+          <a:p>
+            <a:r>
+              <a:rPr lang="en-US" dirty="0" smtClean="0"/>
+              <a:t>Why do Healthy people commit Suicide?</a:t>
+            </a:r>
+            <a:endParaRPr lang="en-US" dirty="0"/>
+          </a:p>
+        </p:txBody>
+      </p:sp>
+      <p:pic>
+        <p:nvPicPr>
+          <p:cNvPr id="19458" name="Picture 2"/>
+          <p:cNvPicPr>
+            <a:picLocks noGrp="1" noChangeAspect="1" noChangeArrowheads="1"/>
+          </p:cNvPicPr>
+          <p:nvPr>
+            <p:ph idx="1"/>
+          </p:nvPr>
+        </p:nvPicPr>
+        <p:blipFill>
+          <a:blip r:embed="rId3" cstate="print">
+            <a:extLst>
+              <a:ext uri="{28A0092B-C50C-407E-A947-70E740481C1C}">
+                <a14:useLocalDpi xmlns:a14="http://schemas.microsoft.com/office/drawing/2010/main" val="0"/>
+              </a:ext>
+            </a:extLst>
+          </a:blip>
+          <a:srcRect/>
+          <a:stretch>
+            <a:fillRect/>
+          </a:stretch>
+        </p:blipFill>
+        <p:spPr bwMode="auto">
+          <a:xfrm>
+            <a:off x="914400" y="1447800"/>
+            <a:ext cx="2382855" cy="1470562"/>
+          </a:xfrm>
+          <a:prstGeom prst="rect">
+            <a:avLst/>
+          </a:prstGeom>
+          <a:noFill/>
+          <a:ln>
+            <a:noFill/>
+          </a:ln>
+          <a:effectLst/>
+          <a:extLst>
+            <a:ext uri="{909E8E84-426E-40DD-AFC4-6F175D3DCCD1}">
+              <a14:hiddenFill xmlns:a14="http://schemas.microsoft.com/office/drawing/2010/main">
+                <a:solidFill>
+                  <a:schemeClr val="accent1"/>
+                </a:solidFill>
+              </a14:hiddenFill>
+            </a:ext>
+            <a:ext uri="{91240B29-F687-4F45-9708-019B960494DF}">
+              <a14:hiddenLine xmlns:a14="http://schemas.microsoft.com/office/drawing/2010/main" w="9525">
+                <a:solidFill>
+                  <a:schemeClr val="tx1"/>
+                </a:solidFill>
+                <a:miter lim="800000"/>
+                <a:headEnd/>
+                <a:tailEnd/>
+              </a14:hiddenLine>
+            </a:ext>
+            <a:ext uri="{AF507438-7753-43E0-B8FC-AC1667EBCBE1}">
+              <a14:hiddenEffects xmlns:a14="http://schemas.microsoft.com/office/drawing/2010/main">
+                <a:effectLst>
+                  <a:outerShdw dist="35921" dir="2700000" algn="ctr" rotWithShape="0">
+                    <a:schemeClr val="bg2"/>
+                  </a:outerShdw>
+                </a:effectLst>
+              </a14:hiddenEffects>
+            </a:ext>
+          </a:extLst>
+        </p:spPr>
+      </p:pic>
+      <p:pic>
+        <p:nvPicPr>
+          <p:cNvPr id="19459" name="Picture 3"/>
+          <p:cNvPicPr>
+            <a:picLocks noChangeAspect="1" noChangeArrowheads="1"/>
+          </p:cNvPicPr>
+          <p:nvPr/>
+        </p:nvPicPr>
+        <p:blipFill>
+          <a:blip r:embed="rId4">
+            <a:extLst>
+              <a:ext uri="{28A0092B-C50C-407E-A947-70E740481C1C}">
+                <a14:useLocalDpi xmlns:a14="http://schemas.microsoft.com/office/drawing/2010/main" val="0"/>
+              </a:ext>
+            </a:extLst>
+          </a:blip>
+          <a:srcRect/>
+          <a:stretch>
+            <a:fillRect/>
+          </a:stretch>
+        </p:blipFill>
+        <p:spPr bwMode="auto">
+          <a:xfrm>
+            <a:off x="914400" y="2996261"/>
+            <a:ext cx="5638800" cy="3480774"/>
+          </a:xfrm>
+          <a:prstGeom prst="rect">
+            <a:avLst/>
+          </a:prstGeom>
+          <a:noFill/>
+          <a:ln>
+            <a:noFill/>
+          </a:ln>
+          <a:effectLst/>
+          <a:extLst>
+            <a:ext uri="{909E8E84-426E-40DD-AFC4-6F175D3DCCD1}">
+              <a14:hiddenFill xmlns:a14="http://schemas.microsoft.com/office/drawing/2010/main">
+                <a:solidFill>
+                  <a:schemeClr val="accent1"/>
+                </a:solidFill>
+              </a14:hiddenFill>
+            </a:ext>
+            <a:ext uri="{91240B29-F687-4F45-9708-019B960494DF}">
+              <a14:hiddenLine xmlns:a14="http://schemas.microsoft.com/office/drawing/2010/main" w="9525">
+                <a:solidFill>
+                  <a:schemeClr val="tx1"/>
+                </a:solidFill>
+                <a:miter lim="800000"/>
+                <a:headEnd/>
+                <a:tailEnd/>
+              </a14:hiddenLine>
+            </a:ext>
+            <a:ext uri="{AF507438-7753-43E0-B8FC-AC1667EBCBE1}">
+              <a14:hiddenEffects xmlns:a14="http://schemas.microsoft.com/office/drawing/2010/main">
+                <a:effectLst>
+                  <a:outerShdw dist="35921" dir="2700000" algn="ctr" rotWithShape="0">
+                    <a:schemeClr val="bg2"/>
+                  </a:outerShdw>
+                </a:effectLst>
+              </a14:hiddenEffects>
+            </a:ext>
+          </a:extLst>
+        </p:spPr>
+      </p:pic>
+    </p:spTree>
+    <p:extLst>
+      <p:ext uri="{BB962C8B-B14F-4D97-AF65-F5344CB8AC3E}">
+        <p14:creationId xmlns:p14="http://schemas.microsoft.com/office/powerpoint/2010/main" val="3119771388"/>
+      </p:ext>
+    </p:extLst>
+  </p:cSld>
+  <p:clrMapOvr>
+    <a:masterClrMapping/>
+  </p:clrMapOvr>
+  <p:timing>
+    <p:tnLst>
+      <p:par>
+        <p:cTn id="1" dur="indefinite" restart="never" nodeType="tmRoot"/>
+      </p:par>
+    </p:tnLst>
+  </p:timing>
+</p:sld>
+</file>
+
+<file path=ppt/slides/slide24.xml><?xml version="1.0" encoding="utf-8"?>
+<p:sld xmlns:a="http://schemas.openxmlformats.org/drawingml/2006/main" xmlns:r="http://schemas.openxmlformats.org/officeDocument/2006/relationships" xmlns:p="http://schemas.openxmlformats.org/presentationml/2006/main">
+  <p:cSld>
+    <p:spTree>
+      <p:nvGrpSpPr>
+        <p:cNvPr id="1" name=""/>
+        <p:cNvGrpSpPr/>
+        <p:nvPr/>
+      </p:nvGrpSpPr>
+      <p:grpSpPr>
+        <a:xfrm>
+          <a:off x="0" y="0"/>
+          <a:ext cx="0" cy="0"/>
+          <a:chOff x="0" y="0"/>
+          <a:chExt cx="0" cy="0"/>
+        </a:xfrm>
+      </p:grpSpPr>
+      <p:sp>
+        <p:nvSpPr>
+          <p:cNvPr id="3" name="Content Placeholder 2"/>
+          <p:cNvSpPr>
+            <a:spLocks noGrp="1"/>
+          </p:cNvSpPr>
+          <p:nvPr>
+            <p:ph idx="1"/>
+          </p:nvPr>
+        </p:nvSpPr>
+        <p:spPr>
+          <a:xfrm>
+            <a:off x="457200" y="228600"/>
+            <a:ext cx="8229600" cy="5897563"/>
+          </a:xfrm>
+        </p:spPr>
+        <p:txBody>
+          <a:bodyPr>
+            <a:normAutofit/>
+          </a:bodyPr>
+          <a:lstStyle/>
+          <a:p>
+            <a:pPr marL="0" indent="0">
+              <a:buNone/>
+            </a:pPr>
+            <a:r>
+              <a:rPr lang="en-US" sz="1400" dirty="0" smtClean="0"/>
+              <a:t>For all the factors that drive people towards Suicide, Government could launch some Counseling campaigns to locate and help such people in a way helpful for their respective reasons.</a:t>
+            </a:r>
+          </a:p>
+          <a:p>
+            <a:endParaRPr lang="en-US" sz="1400" dirty="0"/>
+          </a:p>
+          <a:p>
+            <a:endParaRPr lang="en-US" sz="1400" dirty="0"/>
+          </a:p>
+        </p:txBody>
+      </p:sp>
+      <p:pic>
+        <p:nvPicPr>
+          <p:cNvPr id="21506" name="Picture 2"/>
+          <p:cNvPicPr>
+            <a:picLocks noChangeAspect="1" noChangeArrowheads="1"/>
+          </p:cNvPicPr>
+          <p:nvPr/>
+        </p:nvPicPr>
+        <p:blipFill>
+          <a:blip r:embed="rId2" cstate="print">
+            <a:extLst>
+              <a:ext uri="{28A0092B-C50C-407E-A947-70E740481C1C}">
+                <a14:useLocalDpi xmlns:a14="http://schemas.microsoft.com/office/drawing/2010/main" val="0"/>
+              </a:ext>
+            </a:extLst>
+          </a:blip>
+          <a:srcRect/>
+          <a:stretch>
+            <a:fillRect/>
+          </a:stretch>
+        </p:blipFill>
+        <p:spPr bwMode="auto">
+          <a:xfrm>
+            <a:off x="214114" y="914400"/>
+            <a:ext cx="8777486" cy="5486400"/>
+          </a:xfrm>
+          <a:prstGeom prst="rect">
+            <a:avLst/>
+          </a:prstGeom>
+          <a:noFill/>
+          <a:ln>
+            <a:noFill/>
+          </a:ln>
+          <a:effectLst/>
+          <a:extLst>
+            <a:ext uri="{909E8E84-426E-40DD-AFC4-6F175D3DCCD1}">
+              <a14:hiddenFill xmlns:a14="http://schemas.microsoft.com/office/drawing/2010/main">
+                <a:solidFill>
+                  <a:schemeClr val="accent1"/>
+                </a:solidFill>
+              </a14:hiddenFill>
+            </a:ext>
+            <a:ext uri="{91240B29-F687-4F45-9708-019B960494DF}">
+              <a14:hiddenLine xmlns:a14="http://schemas.microsoft.com/office/drawing/2010/main" w="9525">
+                <a:solidFill>
+                  <a:schemeClr val="tx1"/>
+                </a:solidFill>
+                <a:miter lim="800000"/>
+                <a:headEnd/>
+                <a:tailEnd/>
+              </a14:hiddenLine>
+            </a:ext>
+            <a:ext uri="{AF507438-7753-43E0-B8FC-AC1667EBCBE1}">
+              <a14:hiddenEffects xmlns:a14="http://schemas.microsoft.com/office/drawing/2010/main">
+                <a:effectLst>
+                  <a:outerShdw dist="35921" dir="2700000" algn="ctr" rotWithShape="0">
+                    <a:schemeClr val="bg2"/>
+                  </a:outerShdw>
+                </a:effectLst>
+              </a14:hiddenEffects>
+            </a:ext>
+          </a:extLst>
+        </p:spPr>
+      </p:pic>
+    </p:spTree>
+    <p:extLst>
+      <p:ext uri="{BB962C8B-B14F-4D97-AF65-F5344CB8AC3E}">
+        <p14:creationId xmlns:p14="http://schemas.microsoft.com/office/powerpoint/2010/main" val="935001325"/>
+      </p:ext>
+    </p:extLst>
+  </p:cSld>
+  <p:clrMapOvr>
+    <a:masterClrMapping/>
+  </p:clrMapOvr>
+  <p:timing>
+    <p:tnLst>
+      <p:par>
+        <p:cTn id="1" dur="indefinite" restart="never" nodeType="tmRoot"/>
+      </p:par>
+    </p:tnLst>
+  </p:timing>
+</p:sld>
+</file>
+
+<file path=ppt/slides/slide3.xml><?xml version="1.0" encoding="utf-8"?>
 <p:sld xmlns:a="http://schemas.openxmlformats.org/drawingml/2006/main" xmlns:r="http://schemas.openxmlformats.org/officeDocument/2006/relationships" xmlns:p="http://schemas.openxmlformats.org/presentationml/2006/main">
   <p:cSld>
     <p:spTree>
@@ -5376,10 +8377,17 @@
   <p:clrMapOvr>
     <a:masterClrMapping/>
   </p:clrMapOvr>
+  <p:timing>
+    <p:tnLst>
+      <p:par>
+        <p:cTn id="1" dur="indefinite" restart="never" nodeType="tmRoot"/>
+      </p:par>
+    </p:tnLst>
+  </p:timing>
 </p:sld>
 </file>
 
-<file path=ppt/slides/slide3.xml><?xml version="1.0" encoding="utf-8"?>
+<file path=ppt/slides/slide4.xml><?xml version="1.0" encoding="utf-8"?>
 <p:sld xmlns:a="http://schemas.openxmlformats.org/drawingml/2006/main" xmlns:r="http://schemas.openxmlformats.org/officeDocument/2006/relationships" xmlns:p="http://schemas.openxmlformats.org/presentationml/2006/main">
   <p:cSld>
     <p:spTree>
@@ -5398,7 +8406,7 @@
       </p:grpSpPr>
       <p:pic>
         <p:nvPicPr>
-          <p:cNvPr id="2053" name="Picture 5"/>
+          <p:cNvPr id="10243" name="Picture 3"/>
           <p:cNvPicPr>
             <a:picLocks noGrp="1" noChangeAspect="1" noChangeArrowheads="1"/>
           </p:cNvPicPr>
@@ -5421,7 +8429,7 @@
         </p:blipFill>
         <p:spPr bwMode="auto">
           <a:xfrm>
-            <a:off x="1238666" y="1196438"/>
+            <a:off x="1066800" y="1219200"/>
             <a:ext cx="6666667" cy="4114286"/>
           </a:xfrm>
           <a:prstGeom prst="rect">
@@ -5472,10 +8480,17 @@
   <p:clrMapOvr>
     <a:masterClrMapping/>
   </p:clrMapOvr>
+  <p:timing>
+    <p:tnLst>
+      <p:par>
+        <p:cTn id="1" dur="indefinite" restart="never" nodeType="tmRoot"/>
+      </p:par>
+    </p:tnLst>
+  </p:timing>
 </p:sld>
 </file>
 
-<file path=ppt/slides/slide4.xml><?xml version="1.0" encoding="utf-8"?>
+<file path=ppt/slides/slide5.xml><?xml version="1.0" encoding="utf-8"?>
 <p:sld xmlns:a="http://schemas.openxmlformats.org/drawingml/2006/main" xmlns:r="http://schemas.openxmlformats.org/officeDocument/2006/relationships" xmlns:p="http://schemas.openxmlformats.org/presentationml/2006/main">
   <p:cSld>
     <p:spTree>
@@ -5591,10 +8606,17 @@
   <p:clrMapOvr>
     <a:masterClrMapping/>
   </p:clrMapOvr>
+  <p:timing>
+    <p:tnLst>
+      <p:par>
+        <p:cTn id="1" dur="indefinite" restart="never" nodeType="tmRoot"/>
+      </p:par>
+    </p:tnLst>
+  </p:timing>
 </p:sld>
 </file>
 
-<file path=ppt/slides/slide5.xml><?xml version="1.0" encoding="utf-8"?>
+<file path=ppt/slides/slide6.xml><?xml version="1.0" encoding="utf-8"?>
 <p:sld xmlns:a="http://schemas.openxmlformats.org/drawingml/2006/main" xmlns:r="http://schemas.openxmlformats.org/officeDocument/2006/relationships" xmlns:p="http://schemas.openxmlformats.org/presentationml/2006/main">
   <p:cSld>
     <p:spTree>
@@ -5710,10 +8732,17 @@
   <p:clrMapOvr>
     <a:masterClrMapping/>
   </p:clrMapOvr>
+  <p:timing>
+    <p:tnLst>
+      <p:par>
+        <p:cTn id="1" dur="indefinite" restart="never" nodeType="tmRoot"/>
+      </p:par>
+    </p:tnLst>
+  </p:timing>
 </p:sld>
 </file>
 
-<file path=ppt/slides/slide6.xml><?xml version="1.0" encoding="utf-8"?>
+<file path=ppt/slides/slide7.xml><?xml version="1.0" encoding="utf-8"?>
 <p:sld xmlns:a="http://schemas.openxmlformats.org/drawingml/2006/main" xmlns:r="http://schemas.openxmlformats.org/officeDocument/2006/relationships" xmlns:p="http://schemas.openxmlformats.org/presentationml/2006/main">
   <p:cSld>
     <p:spTree>
@@ -5806,10 +8835,17 @@
   <p:clrMapOvr>
     <a:masterClrMapping/>
   </p:clrMapOvr>
+  <p:timing>
+    <p:tnLst>
+      <p:par>
+        <p:cTn id="1" dur="indefinite" restart="never" nodeType="tmRoot"/>
+      </p:par>
+    </p:tnLst>
+  </p:timing>
 </p:sld>
 </file>
 
-<file path=ppt/slides/slide7.xml><?xml version="1.0" encoding="utf-8"?>
+<file path=ppt/slides/slide8.xml><?xml version="1.0" encoding="utf-8"?>
 <p:sld xmlns:a="http://schemas.openxmlformats.org/drawingml/2006/main" xmlns:r="http://schemas.openxmlformats.org/officeDocument/2006/relationships" xmlns:p="http://schemas.openxmlformats.org/presentationml/2006/main">
   <p:cSld>
     <p:spTree>
@@ -5828,7 +8864,7 @@
       </p:grpSpPr>
       <p:pic>
         <p:nvPicPr>
-          <p:cNvPr id="3075" name="Picture 3" descr="D:\Upswing Quest\Projects\Springboard\Capstone\NLMS\output\plot_3.png"/>
+          <p:cNvPr id="3076" name="Picture 4"/>
           <p:cNvPicPr>
             <a:picLocks noGrp="1" noChangeAspect="1" noChangeArrowheads="1"/>
           </p:cNvPicPr>
@@ -5851,20 +8887,43 @@
         </p:blipFill>
         <p:spPr bwMode="auto">
           <a:xfrm>
-            <a:off x="381000" y="380998"/>
-            <a:ext cx="8598779" cy="5181602"/>
+            <a:off x="101600" y="1066800"/>
+            <a:ext cx="8890000" cy="5486400"/>
           </a:xfrm>
           <a:prstGeom prst="rect">
             <a:avLst/>
           </a:prstGeom>
           <a:noFill/>
+          <a:ln>
+            <a:noFill/>
+          </a:ln>
+          <a:effectLst/>
           <a:extLst>
             <a:ext uri="{909E8E84-426E-40DD-AFC4-6F175D3DCCD1}">
               <a14:hiddenFill xmlns:a14="http://schemas.microsoft.com/office/drawing/2010/main">
                 <a:solidFill>
-                  <a:srgbClr val="FFFFFF"/>
+                  <a:schemeClr val="accent1"/>
                 </a:solidFill>
               </a14:hiddenFill>
+            </a:ext>
+            <a:ext uri="{91240B29-F687-4F45-9708-019B960494DF}">
+              <a14:hiddenLine xmlns:a14="http://schemas.microsoft.com/office/drawing/2010/main" w="9525">
+                <a:solidFill>
+                  <a:schemeClr val="tx1"/>
+                </a:solidFill>
+                <a:miter lim="800000"/>
+                <a:headEnd/>
+                <a:tailEnd/>
+              </a14:hiddenLine>
+            </a:ext>
+            <a:ext uri="{AF507438-7753-43E0-B8FC-AC1667EBCBE1}">
+              <a14:hiddenEffects xmlns:a14="http://schemas.microsoft.com/office/drawing/2010/main">
+                <a:effectLst>
+                  <a:outerShdw dist="35921" dir="2700000" algn="ctr" rotWithShape="0">
+                    <a:schemeClr val="bg2"/>
+                  </a:outerShdw>
+                </a:effectLst>
+              </a14:hiddenEffects>
             </a:ext>
           </a:extLst>
         </p:spPr>
@@ -5879,10 +8938,17 @@
   <p:clrMapOvr>
     <a:masterClrMapping/>
   </p:clrMapOvr>
+  <p:timing>
+    <p:tnLst>
+      <p:par>
+        <p:cTn id="1" dur="indefinite" restart="never" nodeType="tmRoot"/>
+      </p:par>
+    </p:tnLst>
+  </p:timing>
 </p:sld>
 </file>
 
-<file path=ppt/slides/slide8.xml><?xml version="1.0" encoding="utf-8"?>
+<file path=ppt/slides/slide9.xml><?xml version="1.0" encoding="utf-8"?>
 <p:sld xmlns:a="http://schemas.openxmlformats.org/drawingml/2006/main" xmlns:r="http://schemas.openxmlformats.org/officeDocument/2006/relationships" xmlns:p="http://schemas.openxmlformats.org/presentationml/2006/main">
   <p:cSld>
     <p:spTree>
@@ -6000,125 +9066,13 @@
   <p:clrMapOvr>
     <a:masterClrMapping/>
   </p:clrMapOvr>
-</p:sld>
-</file>
-
-<file path=ppt/slides/slide9.xml><?xml version="1.0" encoding="utf-8"?>
-<p:sld xmlns:a="http://schemas.openxmlformats.org/drawingml/2006/main" xmlns:r="http://schemas.openxmlformats.org/officeDocument/2006/relationships" xmlns:p="http://schemas.openxmlformats.org/presentationml/2006/main">
-  <p:cSld>
-    <p:spTree>
-      <p:nvGrpSpPr>
-        <p:cNvPr id="1" name=""/>
-        <p:cNvGrpSpPr/>
-        <p:nvPr/>
-      </p:nvGrpSpPr>
-      <p:grpSpPr>
-        <a:xfrm>
-          <a:off x="0" y="0"/>
-          <a:ext cx="0" cy="0"/>
-          <a:chOff x="0" y="0"/>
-          <a:chExt cx="0" cy="0"/>
-        </a:xfrm>
-      </p:grpSpPr>
-      <p:sp>
-        <p:nvSpPr>
-          <p:cNvPr id="2" name="Title 1"/>
-          <p:cNvSpPr>
-            <a:spLocks noGrp="1"/>
-          </p:cNvSpPr>
-          <p:nvPr>
-            <p:ph type="title"/>
-          </p:nvPr>
-        </p:nvSpPr>
-        <p:spPr/>
-        <p:txBody>
-          <a:bodyPr/>
-          <a:lstStyle/>
-          <a:p>
-            <a:r>
-              <a:rPr lang="en-US" dirty="0" smtClean="0"/>
-              <a:t>Occupation, Location, Race</a:t>
-            </a:r>
-            <a:endParaRPr lang="en-US" dirty="0"/>
-          </a:p>
-        </p:txBody>
-      </p:sp>
-      <p:pic>
-        <p:nvPicPr>
-          <p:cNvPr id="5122" name="Picture 2"/>
-          <p:cNvPicPr>
-            <a:picLocks noGrp="1" noChangeAspect="1" noChangeArrowheads="1"/>
-          </p:cNvPicPr>
-          <p:nvPr>
-            <p:ph idx="1"/>
-          </p:nvPr>
-        </p:nvPicPr>
-        <p:blipFill>
-          <a:blip r:embed="rId2">
-            <a:extLst>
-              <a:ext uri="{28A0092B-C50C-407E-A947-70E740481C1C}">
-                <a14:useLocalDpi xmlns:a14="http://schemas.microsoft.com/office/drawing/2010/main" val="0"/>
-              </a:ext>
-            </a:extLst>
-          </a:blip>
-          <a:srcRect/>
-          <a:stretch>
-            <a:fillRect/>
-          </a:stretch>
-        </p:blipFill>
-        <p:spPr bwMode="auto">
-          <a:xfrm>
-            <a:off x="1238666" y="1806038"/>
-            <a:ext cx="6666667" cy="4114286"/>
-          </a:xfrm>
-          <a:prstGeom prst="rect">
-            <a:avLst/>
-          </a:prstGeom>
-          <a:noFill/>
-          <a:ln>
-            <a:noFill/>
-          </a:ln>
-          <a:effectLst/>
-          <a:extLst>
-            <a:ext uri="{909E8E84-426E-40DD-AFC4-6F175D3DCCD1}">
-              <a14:hiddenFill xmlns:a14="http://schemas.microsoft.com/office/drawing/2010/main">
-                <a:solidFill>
-                  <a:schemeClr val="accent1"/>
-                </a:solidFill>
-              </a14:hiddenFill>
-            </a:ext>
-            <a:ext uri="{91240B29-F687-4F45-9708-019B960494DF}">
-              <a14:hiddenLine xmlns:a14="http://schemas.microsoft.com/office/drawing/2010/main" w="9525">
-                <a:solidFill>
-                  <a:schemeClr val="tx1"/>
-                </a:solidFill>
-                <a:miter lim="800000"/>
-                <a:headEnd/>
-                <a:tailEnd/>
-              </a14:hiddenLine>
-            </a:ext>
-            <a:ext uri="{AF507438-7753-43E0-B8FC-AC1667EBCBE1}">
-              <a14:hiddenEffects xmlns:a14="http://schemas.microsoft.com/office/drawing/2010/main">
-                <a:effectLst>
-                  <a:outerShdw dist="35921" dir="2700000" algn="ctr" rotWithShape="0">
-                    <a:schemeClr val="bg2"/>
-                  </a:outerShdw>
-                </a:effectLst>
-              </a14:hiddenEffects>
-            </a:ext>
-          </a:extLst>
-        </p:spPr>
-      </p:pic>
-    </p:spTree>
-    <p:extLst>
-      <p:ext uri="{BB962C8B-B14F-4D97-AF65-F5344CB8AC3E}">
-        <p14:creationId xmlns:p14="http://schemas.microsoft.com/office/powerpoint/2010/main" val="1451731233"/>
-      </p:ext>
-    </p:extLst>
-  </p:cSld>
-  <p:clrMapOvr>
-    <a:masterClrMapping/>
-  </p:clrMapOvr>
+  <p:timing>
+    <p:tnLst>
+      <p:par>
+        <p:cTn id="1" dur="indefinite" restart="never" nodeType="tmRoot"/>
+      </p:par>
+    </p:tnLst>
+  </p:timing>
 </p:sld>
 </file>
 

</xml_diff>